<commit_message>
Updated Circular Motion chapter by using materials from 2011 edition.
</commit_message>
<xml_diff>
--- a/assets/images/Presentation1.pptx
+++ b/assets/images/Presentation1.pptx
@@ -16,6 +16,8 @@
     <p:sldId id="265" r:id="rId10"/>
     <p:sldId id="258" r:id="rId11"/>
     <p:sldId id="266" r:id="rId12"/>
+    <p:sldId id="267" r:id="rId13"/>
+    <p:sldId id="268" r:id="rId14"/>
   </p:sldIdLst>
   <p:sldSz cx="12192000" cy="6858000"/>
   <p:notesSz cx="6858000" cy="9144000"/>
@@ -269,7 +271,7 @@
           <a:p>
             <a:fld id="{686FC618-AD5E-8F46-8BDC-E9494A47BFB4}" type="datetimeFigureOut">
               <a:rPr lang="en-US" smtClean="0"/>
-              <a:t>11/23/24</a:t>
+              <a:t>12/15/24</a:t>
             </a:fld>
             <a:endParaRPr lang="en-US"/>
           </a:p>
@@ -467,7 +469,7 @@
           <a:p>
             <a:fld id="{686FC618-AD5E-8F46-8BDC-E9494A47BFB4}" type="datetimeFigureOut">
               <a:rPr lang="en-US" smtClean="0"/>
-              <a:t>11/23/24</a:t>
+              <a:t>12/15/24</a:t>
             </a:fld>
             <a:endParaRPr lang="en-US"/>
           </a:p>
@@ -675,7 +677,7 @@
           <a:p>
             <a:fld id="{686FC618-AD5E-8F46-8BDC-E9494A47BFB4}" type="datetimeFigureOut">
               <a:rPr lang="en-US" smtClean="0"/>
-              <a:t>11/23/24</a:t>
+              <a:t>12/15/24</a:t>
             </a:fld>
             <a:endParaRPr lang="en-US"/>
           </a:p>
@@ -873,7 +875,7 @@
           <a:p>
             <a:fld id="{686FC618-AD5E-8F46-8BDC-E9494A47BFB4}" type="datetimeFigureOut">
               <a:rPr lang="en-US" smtClean="0"/>
-              <a:t>11/23/24</a:t>
+              <a:t>12/15/24</a:t>
             </a:fld>
             <a:endParaRPr lang="en-US"/>
           </a:p>
@@ -1148,7 +1150,7 @@
           <a:p>
             <a:fld id="{686FC618-AD5E-8F46-8BDC-E9494A47BFB4}" type="datetimeFigureOut">
               <a:rPr lang="en-US" smtClean="0"/>
-              <a:t>11/23/24</a:t>
+              <a:t>12/15/24</a:t>
             </a:fld>
             <a:endParaRPr lang="en-US"/>
           </a:p>
@@ -1413,7 +1415,7 @@
           <a:p>
             <a:fld id="{686FC618-AD5E-8F46-8BDC-E9494A47BFB4}" type="datetimeFigureOut">
               <a:rPr lang="en-US" smtClean="0"/>
-              <a:t>11/23/24</a:t>
+              <a:t>12/15/24</a:t>
             </a:fld>
             <a:endParaRPr lang="en-US"/>
           </a:p>
@@ -1825,7 +1827,7 @@
           <a:p>
             <a:fld id="{686FC618-AD5E-8F46-8BDC-E9494A47BFB4}" type="datetimeFigureOut">
               <a:rPr lang="en-US" smtClean="0"/>
-              <a:t>11/23/24</a:t>
+              <a:t>12/15/24</a:t>
             </a:fld>
             <a:endParaRPr lang="en-US"/>
           </a:p>
@@ -1966,7 +1968,7 @@
           <a:p>
             <a:fld id="{686FC618-AD5E-8F46-8BDC-E9494A47BFB4}" type="datetimeFigureOut">
               <a:rPr lang="en-US" smtClean="0"/>
-              <a:t>11/23/24</a:t>
+              <a:t>12/15/24</a:t>
             </a:fld>
             <a:endParaRPr lang="en-US"/>
           </a:p>
@@ -2079,7 +2081,7 @@
           <a:p>
             <a:fld id="{686FC618-AD5E-8F46-8BDC-E9494A47BFB4}" type="datetimeFigureOut">
               <a:rPr lang="en-US" smtClean="0"/>
-              <a:t>11/23/24</a:t>
+              <a:t>12/15/24</a:t>
             </a:fld>
             <a:endParaRPr lang="en-US"/>
           </a:p>
@@ -2390,7 +2392,7 @@
           <a:p>
             <a:fld id="{686FC618-AD5E-8F46-8BDC-E9494A47BFB4}" type="datetimeFigureOut">
               <a:rPr lang="en-US" smtClean="0"/>
-              <a:t>11/23/24</a:t>
+              <a:t>12/15/24</a:t>
             </a:fld>
             <a:endParaRPr lang="en-US"/>
           </a:p>
@@ -2678,7 +2680,7 @@
           <a:p>
             <a:fld id="{686FC618-AD5E-8F46-8BDC-E9494A47BFB4}" type="datetimeFigureOut">
               <a:rPr lang="en-US" smtClean="0"/>
-              <a:t>11/23/24</a:t>
+              <a:t>12/15/24</a:t>
             </a:fld>
             <a:endParaRPr lang="en-US"/>
           </a:p>
@@ -2919,7 +2921,7 @@
           <a:p>
             <a:fld id="{686FC618-AD5E-8F46-8BDC-E9494A47BFB4}" type="datetimeFigureOut">
               <a:rPr lang="en-US" smtClean="0"/>
-              <a:t>11/23/24</a:t>
+              <a:t>12/15/24</a:t>
             </a:fld>
             <a:endParaRPr lang="en-US"/>
           </a:p>
@@ -5105,8 +5107,8 @@
                 </a:fontRef>
               </p:style>
             </p:cxnSp>
-            <mc:AlternateContent xmlns:mc="http://schemas.openxmlformats.org/markup-compatibility/2006">
-              <mc:Choice xmlns:a14="http://schemas.microsoft.com/office/drawing/2010/main" Requires="a14">
+            <mc:AlternateContent xmlns:mc="http://schemas.openxmlformats.org/markup-compatibility/2006" xmlns:a14="http://schemas.microsoft.com/office/drawing/2010/main">
+              <mc:Choice Requires="a14">
                 <p:sp>
                   <p:nvSpPr>
                     <p:cNvPr id="6" name="TextBox 5">
@@ -5156,7 +5158,7 @@
                   </p:txBody>
                 </p:sp>
               </mc:Choice>
-              <mc:Fallback>
+              <mc:Fallback xmlns="">
                 <p:sp>
                   <p:nvSpPr>
                     <p:cNvPr id="6" name="TextBox 5">
@@ -5201,8 +5203,8 @@
                 </p:sp>
               </mc:Fallback>
             </mc:AlternateContent>
-            <mc:AlternateContent xmlns:mc="http://schemas.openxmlformats.org/markup-compatibility/2006">
-              <mc:Choice xmlns:a14="http://schemas.microsoft.com/office/drawing/2010/main" Requires="a14">
+            <mc:AlternateContent xmlns:mc="http://schemas.openxmlformats.org/markup-compatibility/2006" xmlns:a14="http://schemas.microsoft.com/office/drawing/2010/main">
+              <mc:Choice Requires="a14">
                 <p:sp>
                   <p:nvSpPr>
                     <p:cNvPr id="7" name="TextBox 6">
@@ -5252,7 +5254,7 @@
                   </p:txBody>
                 </p:sp>
               </mc:Choice>
-              <mc:Fallback>
+              <mc:Fallback xmlns="">
                 <p:sp>
                   <p:nvSpPr>
                     <p:cNvPr id="7" name="TextBox 6">
@@ -5297,8 +5299,8 @@
                 </p:sp>
               </mc:Fallback>
             </mc:AlternateContent>
-            <mc:AlternateContent xmlns:mc="http://schemas.openxmlformats.org/markup-compatibility/2006">
-              <mc:Choice xmlns:a14="http://schemas.microsoft.com/office/drawing/2010/main" Requires="a14">
+            <mc:AlternateContent xmlns:mc="http://schemas.openxmlformats.org/markup-compatibility/2006" xmlns:a14="http://schemas.microsoft.com/office/drawing/2010/main">
+              <mc:Choice Requires="a14">
                 <p:sp>
                   <p:nvSpPr>
                     <p:cNvPr id="8" name="TextBox 7">
@@ -5348,7 +5350,7 @@
                   </p:txBody>
                 </p:sp>
               </mc:Choice>
-              <mc:Fallback>
+              <mc:Fallback xmlns="">
                 <p:sp>
                   <p:nvSpPr>
                     <p:cNvPr id="8" name="TextBox 7">
@@ -5481,8 +5483,8 @@
                 </a:fontRef>
               </p:style>
             </p:cxnSp>
-            <mc:AlternateContent xmlns:mc="http://schemas.openxmlformats.org/markup-compatibility/2006">
-              <mc:Choice xmlns:a14="http://schemas.microsoft.com/office/drawing/2010/main" Requires="a14">
+            <mc:AlternateContent xmlns:mc="http://schemas.openxmlformats.org/markup-compatibility/2006" xmlns:a14="http://schemas.microsoft.com/office/drawing/2010/main">
+              <mc:Choice Requires="a14">
                 <p:sp>
                   <p:nvSpPr>
                     <p:cNvPr id="17" name="TextBox 16">
@@ -5532,7 +5534,7 @@
                   </p:txBody>
                 </p:sp>
               </mc:Choice>
-              <mc:Fallback>
+              <mc:Fallback xmlns="">
                 <p:sp>
                   <p:nvSpPr>
                     <p:cNvPr id="17" name="TextBox 16">
@@ -5577,8 +5579,8 @@
                 </p:sp>
               </mc:Fallback>
             </mc:AlternateContent>
-            <mc:AlternateContent xmlns:mc="http://schemas.openxmlformats.org/markup-compatibility/2006">
-              <mc:Choice xmlns:a14="http://schemas.microsoft.com/office/drawing/2010/main" Requires="a14">
+            <mc:AlternateContent xmlns:mc="http://schemas.openxmlformats.org/markup-compatibility/2006" xmlns:a14="http://schemas.microsoft.com/office/drawing/2010/main">
+              <mc:Choice Requires="a14">
                 <p:sp>
                   <p:nvSpPr>
                     <p:cNvPr id="18" name="TextBox 17">
@@ -5628,7 +5630,7 @@
                   </p:txBody>
                 </p:sp>
               </mc:Choice>
-              <mc:Fallback>
+              <mc:Fallback xmlns="">
                 <p:sp>
                   <p:nvSpPr>
                     <p:cNvPr id="18" name="TextBox 17">
@@ -5724,8 +5726,8 @@
                 </a:p>
               </p:txBody>
             </p:sp>
-            <mc:AlternateContent xmlns:mc="http://schemas.openxmlformats.org/markup-compatibility/2006">
-              <mc:Choice xmlns:a14="http://schemas.microsoft.com/office/drawing/2010/main" Requires="a14">
+            <mc:AlternateContent xmlns:mc="http://schemas.openxmlformats.org/markup-compatibility/2006" xmlns:a14="http://schemas.microsoft.com/office/drawing/2010/main">
+              <mc:Choice Requires="a14">
                 <p:sp>
                   <p:nvSpPr>
                     <p:cNvPr id="20" name="TextBox 19">
@@ -5776,7 +5778,7 @@
                   </p:txBody>
                 </p:sp>
               </mc:Choice>
-              <mc:Fallback>
+              <mc:Fallback xmlns="">
                 <p:sp>
                   <p:nvSpPr>
                     <p:cNvPr id="20" name="TextBox 19">
@@ -5821,8 +5823,8 @@
                 </p:sp>
               </mc:Fallback>
             </mc:AlternateContent>
-            <mc:AlternateContent xmlns:mc="http://schemas.openxmlformats.org/markup-compatibility/2006">
-              <mc:Choice xmlns:a14="http://schemas.microsoft.com/office/drawing/2010/main" Requires="a14">
+            <mc:AlternateContent xmlns:mc="http://schemas.openxmlformats.org/markup-compatibility/2006" xmlns:a14="http://schemas.microsoft.com/office/drawing/2010/main">
+              <mc:Choice Requires="a14">
                 <p:sp>
                   <p:nvSpPr>
                     <p:cNvPr id="23" name="TextBox 22">
@@ -5872,7 +5874,7 @@
                   </p:txBody>
                 </p:sp>
               </mc:Choice>
-              <mc:Fallback>
+              <mc:Fallback xmlns="">
                 <p:sp>
                   <p:nvSpPr>
                     <p:cNvPr id="23" name="TextBox 22">
@@ -5917,8 +5919,8 @@
                 </p:sp>
               </mc:Fallback>
             </mc:AlternateContent>
-            <mc:AlternateContent xmlns:mc="http://schemas.openxmlformats.org/markup-compatibility/2006">
-              <mc:Choice xmlns:a14="http://schemas.microsoft.com/office/drawing/2010/main" Requires="a14">
+            <mc:AlternateContent xmlns:mc="http://schemas.openxmlformats.org/markup-compatibility/2006" xmlns:a14="http://schemas.microsoft.com/office/drawing/2010/main">
+              <mc:Choice Requires="a14">
                 <p:sp>
                   <p:nvSpPr>
                     <p:cNvPr id="24" name="TextBox 23">
@@ -5968,7 +5970,7 @@
                   </p:txBody>
                 </p:sp>
               </mc:Choice>
-              <mc:Fallback>
+              <mc:Fallback xmlns="">
                 <p:sp>
                   <p:nvSpPr>
                     <p:cNvPr id="24" name="TextBox 23">
@@ -6158,8 +6160,8 @@
                 </a:fontRef>
               </p:style>
             </p:cxnSp>
-            <mc:AlternateContent xmlns:mc="http://schemas.openxmlformats.org/markup-compatibility/2006">
-              <mc:Choice xmlns:a14="http://schemas.microsoft.com/office/drawing/2010/main" Requires="a14">
+            <mc:AlternateContent xmlns:mc="http://schemas.openxmlformats.org/markup-compatibility/2006" xmlns:a14="http://schemas.microsoft.com/office/drawing/2010/main">
+              <mc:Choice Requires="a14">
                 <p:sp>
                   <p:nvSpPr>
                     <p:cNvPr id="30" name="TextBox 29">
@@ -6209,7 +6211,7 @@
                   </p:txBody>
                 </p:sp>
               </mc:Choice>
-              <mc:Fallback>
+              <mc:Fallback xmlns="">
                 <p:sp>
                   <p:nvSpPr>
                     <p:cNvPr id="30" name="TextBox 29">
@@ -6254,8 +6256,8 @@
                 </p:sp>
               </mc:Fallback>
             </mc:AlternateContent>
-            <mc:AlternateContent xmlns:mc="http://schemas.openxmlformats.org/markup-compatibility/2006">
-              <mc:Choice xmlns:a14="http://schemas.microsoft.com/office/drawing/2010/main" Requires="a14">
+            <mc:AlternateContent xmlns:mc="http://schemas.openxmlformats.org/markup-compatibility/2006" xmlns:a14="http://schemas.microsoft.com/office/drawing/2010/main">
+              <mc:Choice Requires="a14">
                 <p:sp>
                   <p:nvSpPr>
                     <p:cNvPr id="31" name="TextBox 30">
@@ -6305,7 +6307,7 @@
                   </p:txBody>
                 </p:sp>
               </mc:Choice>
-              <mc:Fallback>
+              <mc:Fallback xmlns="">
                 <p:sp>
                   <p:nvSpPr>
                     <p:cNvPr id="31" name="TextBox 30">
@@ -6350,8 +6352,8 @@
                 </p:sp>
               </mc:Fallback>
             </mc:AlternateContent>
-            <mc:AlternateContent xmlns:mc="http://schemas.openxmlformats.org/markup-compatibility/2006">
-              <mc:Choice xmlns:a14="http://schemas.microsoft.com/office/drawing/2010/main" Requires="a14">
+            <mc:AlternateContent xmlns:mc="http://schemas.openxmlformats.org/markup-compatibility/2006" xmlns:a14="http://schemas.microsoft.com/office/drawing/2010/main">
+              <mc:Choice Requires="a14">
                 <p:sp>
                   <p:nvSpPr>
                     <p:cNvPr id="32" name="TextBox 31">
@@ -6401,7 +6403,7 @@
                   </p:txBody>
                 </p:sp>
               </mc:Choice>
-              <mc:Fallback>
+              <mc:Fallback xmlns="">
                 <p:sp>
                   <p:nvSpPr>
                     <p:cNvPr id="32" name="TextBox 31">
@@ -6534,8 +6536,8 @@
                 </a:fontRef>
               </p:style>
             </p:cxnSp>
-            <mc:AlternateContent xmlns:mc="http://schemas.openxmlformats.org/markup-compatibility/2006">
-              <mc:Choice xmlns:a14="http://schemas.microsoft.com/office/drawing/2010/main" Requires="a14">
+            <mc:AlternateContent xmlns:mc="http://schemas.openxmlformats.org/markup-compatibility/2006" xmlns:a14="http://schemas.microsoft.com/office/drawing/2010/main">
+              <mc:Choice Requires="a14">
                 <p:sp>
                   <p:nvSpPr>
                     <p:cNvPr id="35" name="TextBox 34">
@@ -6585,7 +6587,7 @@
                   </p:txBody>
                 </p:sp>
               </mc:Choice>
-              <mc:Fallback>
+              <mc:Fallback xmlns="">
                 <p:sp>
                   <p:nvSpPr>
                     <p:cNvPr id="35" name="TextBox 34">
@@ -6630,8 +6632,8 @@
                 </p:sp>
               </mc:Fallback>
             </mc:AlternateContent>
-            <mc:AlternateContent xmlns:mc="http://schemas.openxmlformats.org/markup-compatibility/2006">
-              <mc:Choice xmlns:a14="http://schemas.microsoft.com/office/drawing/2010/main" Requires="a14">
+            <mc:AlternateContent xmlns:mc="http://schemas.openxmlformats.org/markup-compatibility/2006" xmlns:a14="http://schemas.microsoft.com/office/drawing/2010/main">
+              <mc:Choice Requires="a14">
                 <p:sp>
                   <p:nvSpPr>
                     <p:cNvPr id="36" name="TextBox 35">
@@ -6681,7 +6683,7 @@
                   </p:txBody>
                 </p:sp>
               </mc:Choice>
-              <mc:Fallback>
+              <mc:Fallback xmlns="">
                 <p:sp>
                   <p:nvSpPr>
                     <p:cNvPr id="36" name="TextBox 35">
@@ -6777,8 +6779,8 @@
                 </a:p>
               </p:txBody>
             </p:sp>
-            <mc:AlternateContent xmlns:mc="http://schemas.openxmlformats.org/markup-compatibility/2006">
-              <mc:Choice xmlns:a14="http://schemas.microsoft.com/office/drawing/2010/main" Requires="a14">
+            <mc:AlternateContent xmlns:mc="http://schemas.openxmlformats.org/markup-compatibility/2006" xmlns:a14="http://schemas.microsoft.com/office/drawing/2010/main">
+              <mc:Choice Requires="a14">
                 <p:sp>
                   <p:nvSpPr>
                     <p:cNvPr id="38" name="TextBox 37">
@@ -6829,7 +6831,7 @@
                   </p:txBody>
                 </p:sp>
               </mc:Choice>
-              <mc:Fallback>
+              <mc:Fallback xmlns="">
                 <p:sp>
                   <p:nvSpPr>
                     <p:cNvPr id="38" name="TextBox 37">
@@ -6874,8 +6876,8 @@
                 </p:sp>
               </mc:Fallback>
             </mc:AlternateContent>
-            <mc:AlternateContent xmlns:mc="http://schemas.openxmlformats.org/markup-compatibility/2006">
-              <mc:Choice xmlns:a14="http://schemas.microsoft.com/office/drawing/2010/main" Requires="a14">
+            <mc:AlternateContent xmlns:mc="http://schemas.openxmlformats.org/markup-compatibility/2006" xmlns:a14="http://schemas.microsoft.com/office/drawing/2010/main">
+              <mc:Choice Requires="a14">
                 <p:sp>
                   <p:nvSpPr>
                     <p:cNvPr id="39" name="TextBox 38">
@@ -6925,7 +6927,7 @@
                   </p:txBody>
                 </p:sp>
               </mc:Choice>
-              <mc:Fallback>
+              <mc:Fallback xmlns="">
                 <p:sp>
                   <p:nvSpPr>
                     <p:cNvPr id="39" name="TextBox 38">
@@ -6970,8 +6972,8 @@
                 </p:sp>
               </mc:Fallback>
             </mc:AlternateContent>
-            <mc:AlternateContent xmlns:mc="http://schemas.openxmlformats.org/markup-compatibility/2006">
-              <mc:Choice xmlns:a14="http://schemas.microsoft.com/office/drawing/2010/main" Requires="a14">
+            <mc:AlternateContent xmlns:mc="http://schemas.openxmlformats.org/markup-compatibility/2006" xmlns:a14="http://schemas.microsoft.com/office/drawing/2010/main">
+              <mc:Choice Requires="a14">
                 <p:sp>
                   <p:nvSpPr>
                     <p:cNvPr id="40" name="TextBox 39">
@@ -7021,7 +7023,7 @@
                   </p:txBody>
                 </p:sp>
               </mc:Choice>
-              <mc:Fallback>
+              <mc:Fallback xmlns="">
                 <p:sp>
                   <p:nvSpPr>
                     <p:cNvPr id="40" name="TextBox 39">
@@ -7211,8 +7213,8 @@
                 </a:fontRef>
               </p:style>
             </p:cxnSp>
-            <mc:AlternateContent xmlns:mc="http://schemas.openxmlformats.org/markup-compatibility/2006">
-              <mc:Choice xmlns:a14="http://schemas.microsoft.com/office/drawing/2010/main" Requires="a14">
+            <mc:AlternateContent xmlns:mc="http://schemas.openxmlformats.org/markup-compatibility/2006" xmlns:a14="http://schemas.microsoft.com/office/drawing/2010/main">
+              <mc:Choice Requires="a14">
                 <p:sp>
                   <p:nvSpPr>
                     <p:cNvPr id="46" name="TextBox 45">
@@ -7262,7 +7264,7 @@
                   </p:txBody>
                 </p:sp>
               </mc:Choice>
-              <mc:Fallback>
+              <mc:Fallback xmlns="">
                 <p:sp>
                   <p:nvSpPr>
                     <p:cNvPr id="46" name="TextBox 45">
@@ -7307,8 +7309,8 @@
                 </p:sp>
               </mc:Fallback>
             </mc:AlternateContent>
-            <mc:AlternateContent xmlns:mc="http://schemas.openxmlformats.org/markup-compatibility/2006">
-              <mc:Choice xmlns:a14="http://schemas.microsoft.com/office/drawing/2010/main" Requires="a14">
+            <mc:AlternateContent xmlns:mc="http://schemas.openxmlformats.org/markup-compatibility/2006" xmlns:a14="http://schemas.microsoft.com/office/drawing/2010/main">
+              <mc:Choice Requires="a14">
                 <p:sp>
                   <p:nvSpPr>
                     <p:cNvPr id="47" name="TextBox 46">
@@ -7358,7 +7360,7 @@
                   </p:txBody>
                 </p:sp>
               </mc:Choice>
-              <mc:Fallback>
+              <mc:Fallback xmlns="">
                 <p:sp>
                   <p:nvSpPr>
                     <p:cNvPr id="47" name="TextBox 46">
@@ -7403,8 +7405,8 @@
                 </p:sp>
               </mc:Fallback>
             </mc:AlternateContent>
-            <mc:AlternateContent xmlns:mc="http://schemas.openxmlformats.org/markup-compatibility/2006">
-              <mc:Choice xmlns:a14="http://schemas.microsoft.com/office/drawing/2010/main" Requires="a14">
+            <mc:AlternateContent xmlns:mc="http://schemas.openxmlformats.org/markup-compatibility/2006" xmlns:a14="http://schemas.microsoft.com/office/drawing/2010/main">
+              <mc:Choice Requires="a14">
                 <p:sp>
                   <p:nvSpPr>
                     <p:cNvPr id="48" name="TextBox 47">
@@ -7454,7 +7456,7 @@
                   </p:txBody>
                 </p:sp>
               </mc:Choice>
-              <mc:Fallback>
+              <mc:Fallback xmlns="">
                 <p:sp>
                   <p:nvSpPr>
                     <p:cNvPr id="48" name="TextBox 47">
@@ -7587,8 +7589,8 @@
                 </a:fontRef>
               </p:style>
             </p:cxnSp>
-            <mc:AlternateContent xmlns:mc="http://schemas.openxmlformats.org/markup-compatibility/2006">
-              <mc:Choice xmlns:a14="http://schemas.microsoft.com/office/drawing/2010/main" Requires="a14">
+            <mc:AlternateContent xmlns:mc="http://schemas.openxmlformats.org/markup-compatibility/2006" xmlns:a14="http://schemas.microsoft.com/office/drawing/2010/main">
+              <mc:Choice Requires="a14">
                 <p:sp>
                   <p:nvSpPr>
                     <p:cNvPr id="51" name="TextBox 50">
@@ -7638,7 +7640,7 @@
                   </p:txBody>
                 </p:sp>
               </mc:Choice>
-              <mc:Fallback>
+              <mc:Fallback xmlns="">
                 <p:sp>
                   <p:nvSpPr>
                     <p:cNvPr id="51" name="TextBox 50">
@@ -7683,8 +7685,8 @@
                 </p:sp>
               </mc:Fallback>
             </mc:AlternateContent>
-            <mc:AlternateContent xmlns:mc="http://schemas.openxmlformats.org/markup-compatibility/2006">
-              <mc:Choice xmlns:a14="http://schemas.microsoft.com/office/drawing/2010/main" Requires="a14">
+            <mc:AlternateContent xmlns:mc="http://schemas.openxmlformats.org/markup-compatibility/2006" xmlns:a14="http://schemas.microsoft.com/office/drawing/2010/main">
+              <mc:Choice Requires="a14">
                 <p:sp>
                   <p:nvSpPr>
                     <p:cNvPr id="52" name="TextBox 51">
@@ -7734,7 +7736,7 @@
                   </p:txBody>
                 </p:sp>
               </mc:Choice>
-              <mc:Fallback>
+              <mc:Fallback xmlns="">
                 <p:sp>
                   <p:nvSpPr>
                     <p:cNvPr id="52" name="TextBox 51">
@@ -7830,8 +7832,8 @@
                 </a:p>
               </p:txBody>
             </p:sp>
-            <mc:AlternateContent xmlns:mc="http://schemas.openxmlformats.org/markup-compatibility/2006">
-              <mc:Choice xmlns:a14="http://schemas.microsoft.com/office/drawing/2010/main" Requires="a14">
+            <mc:AlternateContent xmlns:mc="http://schemas.openxmlformats.org/markup-compatibility/2006" xmlns:a14="http://schemas.microsoft.com/office/drawing/2010/main">
+              <mc:Choice Requires="a14">
                 <p:sp>
                   <p:nvSpPr>
                     <p:cNvPr id="54" name="TextBox 53">
@@ -7882,7 +7884,7 @@
                   </p:txBody>
                 </p:sp>
               </mc:Choice>
-              <mc:Fallback>
+              <mc:Fallback xmlns="">
                 <p:sp>
                   <p:nvSpPr>
                     <p:cNvPr id="54" name="TextBox 53">
@@ -7927,8 +7929,8 @@
                 </p:sp>
               </mc:Fallback>
             </mc:AlternateContent>
-            <mc:AlternateContent xmlns:mc="http://schemas.openxmlformats.org/markup-compatibility/2006">
-              <mc:Choice xmlns:a14="http://schemas.microsoft.com/office/drawing/2010/main" Requires="a14">
+            <mc:AlternateContent xmlns:mc="http://schemas.openxmlformats.org/markup-compatibility/2006" xmlns:a14="http://schemas.microsoft.com/office/drawing/2010/main">
+              <mc:Choice Requires="a14">
                 <p:sp>
                   <p:nvSpPr>
                     <p:cNvPr id="55" name="TextBox 54">
@@ -7978,7 +7980,7 @@
                   </p:txBody>
                 </p:sp>
               </mc:Choice>
-              <mc:Fallback>
+              <mc:Fallback xmlns="">
                 <p:sp>
                   <p:nvSpPr>
                     <p:cNvPr id="55" name="TextBox 54">
@@ -8023,8 +8025,8 @@
                 </p:sp>
               </mc:Fallback>
             </mc:AlternateContent>
-            <mc:AlternateContent xmlns:mc="http://schemas.openxmlformats.org/markup-compatibility/2006">
-              <mc:Choice xmlns:a14="http://schemas.microsoft.com/office/drawing/2010/main" Requires="a14">
+            <mc:AlternateContent xmlns:mc="http://schemas.openxmlformats.org/markup-compatibility/2006" xmlns:a14="http://schemas.microsoft.com/office/drawing/2010/main">
+              <mc:Choice Requires="a14">
                 <p:sp>
                   <p:nvSpPr>
                     <p:cNvPr id="56" name="TextBox 55">
@@ -8074,7 +8076,7 @@
                   </p:txBody>
                 </p:sp>
               </mc:Choice>
-              <mc:Fallback>
+              <mc:Fallback xmlns="">
                 <p:sp>
                   <p:nvSpPr>
                     <p:cNvPr id="56" name="TextBox 55">
@@ -8140,8 +8142,8 @@
                 <a:chExt cx="3828493" cy="3131120"/>
               </a:xfrm>
             </p:grpSpPr>
-            <mc:AlternateContent xmlns:mc="http://schemas.openxmlformats.org/markup-compatibility/2006">
-              <mc:Choice xmlns:a14="http://schemas.microsoft.com/office/drawing/2010/main" Requires="a14">
+            <mc:AlternateContent xmlns:mc="http://schemas.openxmlformats.org/markup-compatibility/2006" xmlns:a14="http://schemas.microsoft.com/office/drawing/2010/main">
+              <mc:Choice Requires="a14">
                 <p:sp>
                   <p:nvSpPr>
                     <p:cNvPr id="63" name="TextBox 62">
@@ -8191,7 +8193,7 @@
                   </p:txBody>
                 </p:sp>
               </mc:Choice>
-              <mc:Fallback>
+              <mc:Fallback xmlns="">
                 <p:sp>
                   <p:nvSpPr>
                     <p:cNvPr id="63" name="TextBox 62">
@@ -8360,8 +8362,8 @@
                 </a:fontRef>
               </p:style>
             </p:cxnSp>
-            <mc:AlternateContent xmlns:mc="http://schemas.openxmlformats.org/markup-compatibility/2006">
-              <mc:Choice xmlns:a14="http://schemas.microsoft.com/office/drawing/2010/main" Requires="a14">
+            <mc:AlternateContent xmlns:mc="http://schemas.openxmlformats.org/markup-compatibility/2006" xmlns:a14="http://schemas.microsoft.com/office/drawing/2010/main">
+              <mc:Choice Requires="a14">
                 <p:sp>
                   <p:nvSpPr>
                     <p:cNvPr id="62" name="TextBox 61">
@@ -8411,7 +8413,7 @@
                   </p:txBody>
                 </p:sp>
               </mc:Choice>
-              <mc:Fallback>
+              <mc:Fallback xmlns="">
                 <p:sp>
                   <p:nvSpPr>
                     <p:cNvPr id="62" name="TextBox 61">
@@ -8456,8 +8458,8 @@
                 </p:sp>
               </mc:Fallback>
             </mc:AlternateContent>
-            <mc:AlternateContent xmlns:mc="http://schemas.openxmlformats.org/markup-compatibility/2006">
-              <mc:Choice xmlns:a14="http://schemas.microsoft.com/office/drawing/2010/main" Requires="a14">
+            <mc:AlternateContent xmlns:mc="http://schemas.openxmlformats.org/markup-compatibility/2006" xmlns:a14="http://schemas.microsoft.com/office/drawing/2010/main">
+              <mc:Choice Requires="a14">
                 <p:sp>
                   <p:nvSpPr>
                     <p:cNvPr id="64" name="TextBox 63">
@@ -8507,7 +8509,7 @@
                   </p:txBody>
                 </p:sp>
               </mc:Choice>
-              <mc:Fallback>
+              <mc:Fallback xmlns="">
                 <p:sp>
                   <p:nvSpPr>
                     <p:cNvPr id="64" name="TextBox 63">
@@ -8640,8 +8642,8 @@
                 </a:fontRef>
               </p:style>
             </p:cxnSp>
-            <mc:AlternateContent xmlns:mc="http://schemas.openxmlformats.org/markup-compatibility/2006">
-              <mc:Choice xmlns:a14="http://schemas.microsoft.com/office/drawing/2010/main" Requires="a14">
+            <mc:AlternateContent xmlns:mc="http://schemas.openxmlformats.org/markup-compatibility/2006" xmlns:a14="http://schemas.microsoft.com/office/drawing/2010/main">
+              <mc:Choice Requires="a14">
                 <p:sp>
                   <p:nvSpPr>
                     <p:cNvPr id="67" name="TextBox 66">
@@ -8691,7 +8693,7 @@
                   </p:txBody>
                 </p:sp>
               </mc:Choice>
-              <mc:Fallback>
+              <mc:Fallback xmlns="">
                 <p:sp>
                   <p:nvSpPr>
                     <p:cNvPr id="67" name="TextBox 66">
@@ -8736,8 +8738,8 @@
                 </p:sp>
               </mc:Fallback>
             </mc:AlternateContent>
-            <mc:AlternateContent xmlns:mc="http://schemas.openxmlformats.org/markup-compatibility/2006">
-              <mc:Choice xmlns:a14="http://schemas.microsoft.com/office/drawing/2010/main" Requires="a14">
+            <mc:AlternateContent xmlns:mc="http://schemas.openxmlformats.org/markup-compatibility/2006" xmlns:a14="http://schemas.microsoft.com/office/drawing/2010/main">
+              <mc:Choice Requires="a14">
                 <p:sp>
                   <p:nvSpPr>
                     <p:cNvPr id="68" name="TextBox 67">
@@ -8787,7 +8789,7 @@
                   </p:txBody>
                 </p:sp>
               </mc:Choice>
-              <mc:Fallback>
+              <mc:Fallback xmlns="">
                 <p:sp>
                   <p:nvSpPr>
                     <p:cNvPr id="68" name="TextBox 67">
@@ -8883,8 +8885,8 @@
                 </a:p>
               </p:txBody>
             </p:sp>
-            <mc:AlternateContent xmlns:mc="http://schemas.openxmlformats.org/markup-compatibility/2006">
-              <mc:Choice xmlns:a14="http://schemas.microsoft.com/office/drawing/2010/main" Requires="a14">
+            <mc:AlternateContent xmlns:mc="http://schemas.openxmlformats.org/markup-compatibility/2006" xmlns:a14="http://schemas.microsoft.com/office/drawing/2010/main">
+              <mc:Choice Requires="a14">
                 <p:sp>
                   <p:nvSpPr>
                     <p:cNvPr id="70" name="TextBox 69">
@@ -8935,7 +8937,7 @@
                   </p:txBody>
                 </p:sp>
               </mc:Choice>
-              <mc:Fallback>
+              <mc:Fallback xmlns="">
                 <p:sp>
                   <p:nvSpPr>
                     <p:cNvPr id="70" name="TextBox 69">
@@ -8980,8 +8982,8 @@
                 </p:sp>
               </mc:Fallback>
             </mc:AlternateContent>
-            <mc:AlternateContent xmlns:mc="http://schemas.openxmlformats.org/markup-compatibility/2006">
-              <mc:Choice xmlns:a14="http://schemas.microsoft.com/office/drawing/2010/main" Requires="a14">
+            <mc:AlternateContent xmlns:mc="http://schemas.openxmlformats.org/markup-compatibility/2006" xmlns:a14="http://schemas.microsoft.com/office/drawing/2010/main">
+              <mc:Choice Requires="a14">
                 <p:sp>
                   <p:nvSpPr>
                     <p:cNvPr id="71" name="TextBox 70">
@@ -9031,7 +9033,7 @@
                   </p:txBody>
                 </p:sp>
               </mc:Choice>
-              <mc:Fallback>
+              <mc:Fallback xmlns="">
                 <p:sp>
                   <p:nvSpPr>
                     <p:cNvPr id="71" name="TextBox 70">
@@ -9076,8 +9078,8 @@
                 </p:sp>
               </mc:Fallback>
             </mc:AlternateContent>
-            <mc:AlternateContent xmlns:mc="http://schemas.openxmlformats.org/markup-compatibility/2006">
-              <mc:Choice xmlns:a14="http://schemas.microsoft.com/office/drawing/2010/main" Requires="a14">
+            <mc:AlternateContent xmlns:mc="http://schemas.openxmlformats.org/markup-compatibility/2006" xmlns:a14="http://schemas.microsoft.com/office/drawing/2010/main">
+              <mc:Choice Requires="a14">
                 <p:sp>
                   <p:nvSpPr>
                     <p:cNvPr id="72" name="TextBox 71">
@@ -9127,7 +9129,7 @@
                   </p:txBody>
                 </p:sp>
               </mc:Choice>
-              <mc:Fallback>
+              <mc:Fallback xmlns="">
                 <p:sp>
                   <p:nvSpPr>
                     <p:cNvPr id="72" name="TextBox 71">
@@ -9331,6 +9333,3114 @@
     <p:extLst>
       <p:ext uri="{BB962C8B-B14F-4D97-AF65-F5344CB8AC3E}">
         <p14:creationId xmlns:p14="http://schemas.microsoft.com/office/powerpoint/2010/main" val="1882360311"/>
+      </p:ext>
+    </p:extLst>
+  </p:cSld>
+  <p:clrMapOvr>
+    <a:masterClrMapping/>
+  </p:clrMapOvr>
+</p:sld>
+</file>
+
+<file path=ppt/slides/slide12.xml><?xml version="1.0" encoding="utf-8"?>
+<p:sld xmlns:a="http://schemas.openxmlformats.org/drawingml/2006/main" xmlns:r="http://schemas.openxmlformats.org/officeDocument/2006/relationships" xmlns:p="http://schemas.openxmlformats.org/presentationml/2006/main">
+  <p:cSld>
+    <p:spTree>
+      <p:nvGrpSpPr>
+        <p:cNvPr id="1" name=""/>
+        <p:cNvGrpSpPr/>
+        <p:nvPr/>
+      </p:nvGrpSpPr>
+      <p:grpSpPr>
+        <a:xfrm>
+          <a:off x="0" y="0"/>
+          <a:ext cx="0" cy="0"/>
+          <a:chOff x="0" y="0"/>
+          <a:chExt cx="0" cy="0"/>
+        </a:xfrm>
+      </p:grpSpPr>
+      <p:grpSp>
+        <p:nvGrpSpPr>
+          <p:cNvPr id="37" name="Group 36">
+            <a:extLst>
+              <a:ext uri="{FF2B5EF4-FFF2-40B4-BE49-F238E27FC236}">
+                <a16:creationId xmlns:a16="http://schemas.microsoft.com/office/drawing/2014/main" id="{67157C48-4CA8-B265-93CC-C04705840568}"/>
+              </a:ext>
+            </a:extLst>
+          </p:cNvPr>
+          <p:cNvGrpSpPr/>
+          <p:nvPr/>
+        </p:nvGrpSpPr>
+        <p:grpSpPr>
+          <a:xfrm>
+            <a:off x="2023492" y="425428"/>
+            <a:ext cx="7193072" cy="5376722"/>
+            <a:chOff x="243330" y="289241"/>
+            <a:chExt cx="7193072" cy="5376722"/>
+          </a:xfrm>
+        </p:grpSpPr>
+        <p:cxnSp>
+          <p:nvCxnSpPr>
+            <p:cNvPr id="2" name="Straight Arrow Connector 1">
+              <a:extLst>
+                <a:ext uri="{FF2B5EF4-FFF2-40B4-BE49-F238E27FC236}">
+                  <a16:creationId xmlns:a16="http://schemas.microsoft.com/office/drawing/2014/main" id="{5AA7A0BD-B1DF-FAE4-C538-327866E0B167}"/>
+                </a:ext>
+              </a:extLst>
+            </p:cNvPr>
+            <p:cNvCxnSpPr/>
+            <p:nvPr/>
+          </p:nvCxnSpPr>
+          <p:spPr>
+            <a:xfrm>
+              <a:off x="1403030" y="4232368"/>
+              <a:ext cx="5852160" cy="0"/>
+            </a:xfrm>
+            <a:prstGeom prst="straightConnector1">
+              <a:avLst/>
+            </a:prstGeom>
+            <a:ln w="19050">
+              <a:tailEnd type="triangle" w="lg" len="lg"/>
+            </a:ln>
+          </p:spPr>
+          <p:style>
+            <a:lnRef idx="1">
+              <a:schemeClr val="accent1"/>
+            </a:lnRef>
+            <a:fillRef idx="0">
+              <a:schemeClr val="accent1"/>
+            </a:fillRef>
+            <a:effectRef idx="0">
+              <a:schemeClr val="accent1"/>
+            </a:effectRef>
+            <a:fontRef idx="minor">
+              <a:schemeClr val="tx1"/>
+            </a:fontRef>
+          </p:style>
+        </p:cxnSp>
+        <p:cxnSp>
+          <p:nvCxnSpPr>
+            <p:cNvPr id="3" name="Straight Arrow Connector 2">
+              <a:extLst>
+                <a:ext uri="{FF2B5EF4-FFF2-40B4-BE49-F238E27FC236}">
+                  <a16:creationId xmlns:a16="http://schemas.microsoft.com/office/drawing/2014/main" id="{6DAA3882-7B51-1A98-95D1-3CE46396DF90}"/>
+                </a:ext>
+              </a:extLst>
+            </p:cNvPr>
+            <p:cNvCxnSpPr>
+              <a:cxnSpLocks/>
+            </p:cNvCxnSpPr>
+            <p:nvPr/>
+          </p:nvCxnSpPr>
+          <p:spPr>
+            <a:xfrm rot="16200000">
+              <a:off x="300182" y="3047906"/>
+              <a:ext cx="5029200" cy="0"/>
+            </a:xfrm>
+            <a:prstGeom prst="straightConnector1">
+              <a:avLst/>
+            </a:prstGeom>
+            <a:ln w="19050">
+              <a:tailEnd type="triangle" w="lg" len="lg"/>
+            </a:ln>
+          </p:spPr>
+          <p:style>
+            <a:lnRef idx="1">
+              <a:schemeClr val="accent1"/>
+            </a:lnRef>
+            <a:fillRef idx="0">
+              <a:schemeClr val="accent1"/>
+            </a:fillRef>
+            <a:effectRef idx="0">
+              <a:schemeClr val="accent1"/>
+            </a:effectRef>
+            <a:fontRef idx="minor">
+              <a:schemeClr val="tx1"/>
+            </a:fontRef>
+          </p:style>
+        </p:cxnSp>
+        <p:cxnSp>
+          <p:nvCxnSpPr>
+            <p:cNvPr id="4" name="Straight Arrow Connector 3">
+              <a:extLst>
+                <a:ext uri="{FF2B5EF4-FFF2-40B4-BE49-F238E27FC236}">
+                  <a16:creationId xmlns:a16="http://schemas.microsoft.com/office/drawing/2014/main" id="{17A1660E-029E-F5AD-61AE-B6E82E7A48BB}"/>
+                </a:ext>
+              </a:extLst>
+            </p:cNvPr>
+            <p:cNvCxnSpPr>
+              <a:cxnSpLocks/>
+            </p:cNvCxnSpPr>
+            <p:nvPr/>
+          </p:nvCxnSpPr>
+          <p:spPr>
+            <a:xfrm flipV="1">
+              <a:off x="2810601" y="2102741"/>
+              <a:ext cx="1996176" cy="2110675"/>
+            </a:xfrm>
+            <a:prstGeom prst="straightConnector1">
+              <a:avLst/>
+            </a:prstGeom>
+            <a:ln w="38100">
+              <a:solidFill>
+                <a:srgbClr val="FF0000"/>
+              </a:solidFill>
+              <a:tailEnd type="triangle" w="lg" len="lg"/>
+            </a:ln>
+          </p:spPr>
+          <p:style>
+            <a:lnRef idx="1">
+              <a:schemeClr val="accent1"/>
+            </a:lnRef>
+            <a:fillRef idx="0">
+              <a:schemeClr val="accent1"/>
+            </a:fillRef>
+            <a:effectRef idx="0">
+              <a:schemeClr val="accent1"/>
+            </a:effectRef>
+            <a:fontRef idx="minor">
+              <a:schemeClr val="tx1"/>
+            </a:fontRef>
+          </p:style>
+        </p:cxnSp>
+        <mc:AlternateContent xmlns:mc="http://schemas.openxmlformats.org/markup-compatibility/2006">
+          <mc:Choice xmlns:a14="http://schemas.microsoft.com/office/drawing/2010/main" Requires="a14">
+            <p:sp>
+              <p:nvSpPr>
+                <p:cNvPr id="7" name="TextBox 6">
+                  <a:extLst>
+                    <a:ext uri="{FF2B5EF4-FFF2-40B4-BE49-F238E27FC236}">
+                      <a16:creationId xmlns:a16="http://schemas.microsoft.com/office/drawing/2014/main" id="{14BEFF55-5A24-7562-C499-EF39F94DB57C}"/>
+                    </a:ext>
+                  </a:extLst>
+                </p:cNvPr>
+                <p:cNvSpPr txBox="1"/>
+                <p:nvPr/>
+              </p:nvSpPr>
+              <p:spPr>
+                <a:xfrm>
+                  <a:off x="4758485" y="2098546"/>
+                  <a:ext cx="452175" cy="508857"/>
+                </a:xfrm>
+                <a:prstGeom prst="rect">
+                  <a:avLst/>
+                </a:prstGeom>
+                <a:noFill/>
+              </p:spPr>
+              <p:txBody>
+                <a:bodyPr wrap="none" rtlCol="0">
+                  <a:spAutoFit/>
+                </a:bodyPr>
+                <a:lstStyle/>
+                <a:p>
+                  <a:pPr/>
+                  <a14:m>
+                    <m:oMathPara xmlns:m="http://schemas.openxmlformats.org/officeDocument/2006/math">
+                      <m:oMathParaPr>
+                        <m:jc m:val="centerGroup"/>
+                      </m:oMathParaPr>
+                      <m:oMath xmlns:m="http://schemas.openxmlformats.org/officeDocument/2006/math">
+                        <m:acc>
+                          <m:accPr>
+                            <m:chr m:val="⃗"/>
+                            <m:ctrlPr>
+                              <a:rPr lang="en-US" sz="2400" i="1" smtClean="0">
+                                <a:latin typeface="Cambria Math" panose="02040503050406030204" pitchFamily="18" charset="0"/>
+                              </a:rPr>
+                            </m:ctrlPr>
+                          </m:accPr>
+                          <m:e>
+                            <m:r>
+                              <a:rPr lang="en-US" sz="2400" b="0" i="1" smtClean="0">
+                                <a:latin typeface="Cambria Math" panose="02040503050406030204" pitchFamily="18" charset="0"/>
+                              </a:rPr>
+                              <m:t>𝐴</m:t>
+                            </m:r>
+                          </m:e>
+                        </m:acc>
+                      </m:oMath>
+                    </m:oMathPara>
+                  </a14:m>
+                  <a:endParaRPr lang="en-US" sz="2400" dirty="0"/>
+                </a:p>
+              </p:txBody>
+            </p:sp>
+          </mc:Choice>
+          <mc:Fallback>
+            <p:sp>
+              <p:nvSpPr>
+                <p:cNvPr id="7" name="TextBox 6">
+                  <a:extLst>
+                    <a:ext uri="{FF2B5EF4-FFF2-40B4-BE49-F238E27FC236}">
+                      <a16:creationId xmlns:a16="http://schemas.microsoft.com/office/drawing/2014/main" id="{14BEFF55-5A24-7562-C499-EF39F94DB57C}"/>
+                    </a:ext>
+                  </a:extLst>
+                </p:cNvPr>
+                <p:cNvSpPr txBox="1">
+                  <a:spLocks noRot="1" noChangeAspect="1" noMove="1" noResize="1" noEditPoints="1" noAdjustHandles="1" noChangeArrowheads="1" noChangeShapeType="1" noTextEdit="1"/>
+                </p:cNvSpPr>
+                <p:nvPr/>
+              </p:nvSpPr>
+              <p:spPr>
+                <a:xfrm>
+                  <a:off x="4758485" y="2098546"/>
+                  <a:ext cx="452175" cy="508857"/>
+                </a:xfrm>
+                <a:prstGeom prst="rect">
+                  <a:avLst/>
+                </a:prstGeom>
+                <a:blipFill>
+                  <a:blip r:embed="rId2"/>
+                  <a:stretch>
+                    <a:fillRect t="-24390"/>
+                  </a:stretch>
+                </a:blipFill>
+              </p:spPr>
+              <p:txBody>
+                <a:bodyPr/>
+                <a:lstStyle/>
+                <a:p>
+                  <a:r>
+                    <a:rPr lang="en-US">
+                      <a:noFill/>
+                    </a:rPr>
+                    <a:t> </a:t>
+                  </a:r>
+                </a:p>
+              </p:txBody>
+            </p:sp>
+          </mc:Fallback>
+        </mc:AlternateContent>
+        <mc:AlternateContent xmlns:mc="http://schemas.openxmlformats.org/markup-compatibility/2006">
+          <mc:Choice xmlns:a14="http://schemas.microsoft.com/office/drawing/2010/main" Requires="a14">
+            <p:sp>
+              <p:nvSpPr>
+                <p:cNvPr id="8" name="TextBox 7">
+                  <a:extLst>
+                    <a:ext uri="{FF2B5EF4-FFF2-40B4-BE49-F238E27FC236}">
+                      <a16:creationId xmlns:a16="http://schemas.microsoft.com/office/drawing/2014/main" id="{6AE39BE8-2933-990B-F996-916FBE23FBBD}"/>
+                    </a:ext>
+                  </a:extLst>
+                </p:cNvPr>
+                <p:cNvSpPr txBox="1"/>
+                <p:nvPr/>
+              </p:nvSpPr>
+              <p:spPr>
+                <a:xfrm>
+                  <a:off x="243330" y="5204298"/>
+                  <a:ext cx="426399" cy="461665"/>
+                </a:xfrm>
+                <a:prstGeom prst="rect">
+                  <a:avLst/>
+                </a:prstGeom>
+                <a:noFill/>
+              </p:spPr>
+              <p:txBody>
+                <a:bodyPr wrap="none" rtlCol="0">
+                  <a:spAutoFit/>
+                </a:bodyPr>
+                <a:lstStyle/>
+                <a:p>
+                  <a:pPr/>
+                  <a14:m>
+                    <m:oMathPara xmlns:m="http://schemas.openxmlformats.org/officeDocument/2006/math">
+                      <m:oMathParaPr>
+                        <m:jc m:val="centerGroup"/>
+                      </m:oMathParaPr>
+                      <m:oMath xmlns:m="http://schemas.openxmlformats.org/officeDocument/2006/math">
+                        <m:r>
+                          <a:rPr lang="en-US" sz="2400" b="0" i="1" smtClean="0">
+                            <a:latin typeface="Cambria Math" panose="02040503050406030204" pitchFamily="18" charset="0"/>
+                          </a:rPr>
+                          <m:t>𝑥</m:t>
+                        </m:r>
+                      </m:oMath>
+                    </m:oMathPara>
+                  </a14:m>
+                  <a:endParaRPr lang="en-US" sz="2400" dirty="0"/>
+                </a:p>
+              </p:txBody>
+            </p:sp>
+          </mc:Choice>
+          <mc:Fallback>
+            <p:sp>
+              <p:nvSpPr>
+                <p:cNvPr id="8" name="TextBox 7">
+                  <a:extLst>
+                    <a:ext uri="{FF2B5EF4-FFF2-40B4-BE49-F238E27FC236}">
+                      <a16:creationId xmlns:a16="http://schemas.microsoft.com/office/drawing/2014/main" id="{6AE39BE8-2933-990B-F996-916FBE23FBBD}"/>
+                    </a:ext>
+                  </a:extLst>
+                </p:cNvPr>
+                <p:cNvSpPr txBox="1">
+                  <a:spLocks noRot="1" noChangeAspect="1" noMove="1" noResize="1" noEditPoints="1" noAdjustHandles="1" noChangeArrowheads="1" noChangeShapeType="1" noTextEdit="1"/>
+                </p:cNvSpPr>
+                <p:nvPr/>
+              </p:nvSpPr>
+              <p:spPr>
+                <a:xfrm>
+                  <a:off x="243330" y="5204298"/>
+                  <a:ext cx="426399" cy="461665"/>
+                </a:xfrm>
+                <a:prstGeom prst="rect">
+                  <a:avLst/>
+                </a:prstGeom>
+                <a:blipFill>
+                  <a:blip r:embed="rId3"/>
+                  <a:stretch>
+                    <a:fillRect/>
+                  </a:stretch>
+                </a:blipFill>
+              </p:spPr>
+              <p:txBody>
+                <a:bodyPr/>
+                <a:lstStyle/>
+                <a:p>
+                  <a:r>
+                    <a:rPr lang="en-US">
+                      <a:noFill/>
+                    </a:rPr>
+                    <a:t> </a:t>
+                  </a:r>
+                </a:p>
+              </p:txBody>
+            </p:sp>
+          </mc:Fallback>
+        </mc:AlternateContent>
+        <mc:AlternateContent xmlns:mc="http://schemas.openxmlformats.org/markup-compatibility/2006">
+          <mc:Choice xmlns:a14="http://schemas.microsoft.com/office/drawing/2010/main" Requires="a14">
+            <p:sp>
+              <p:nvSpPr>
+                <p:cNvPr id="9" name="TextBox 8">
+                  <a:extLst>
+                    <a:ext uri="{FF2B5EF4-FFF2-40B4-BE49-F238E27FC236}">
+                      <a16:creationId xmlns:a16="http://schemas.microsoft.com/office/drawing/2014/main" id="{F1A2C1AB-7E07-F2A3-2F6A-83518AC9BFFA}"/>
+                    </a:ext>
+                  </a:extLst>
+                </p:cNvPr>
+                <p:cNvSpPr txBox="1"/>
+                <p:nvPr/>
+              </p:nvSpPr>
+              <p:spPr>
+                <a:xfrm>
+                  <a:off x="7010003" y="4175933"/>
+                  <a:ext cx="426399" cy="461665"/>
+                </a:xfrm>
+                <a:prstGeom prst="rect">
+                  <a:avLst/>
+                </a:prstGeom>
+                <a:noFill/>
+              </p:spPr>
+              <p:txBody>
+                <a:bodyPr wrap="none" rtlCol="0">
+                  <a:spAutoFit/>
+                </a:bodyPr>
+                <a:lstStyle/>
+                <a:p>
+                  <a:pPr/>
+                  <a14:m>
+                    <m:oMathPara xmlns:m="http://schemas.openxmlformats.org/officeDocument/2006/math">
+                      <m:oMathParaPr>
+                        <m:jc m:val="centerGroup"/>
+                      </m:oMathParaPr>
+                      <m:oMath xmlns:m="http://schemas.openxmlformats.org/officeDocument/2006/math">
+                        <m:r>
+                          <a:rPr lang="en-US" sz="2400" b="0" i="1" smtClean="0">
+                            <a:latin typeface="Cambria Math" panose="02040503050406030204" pitchFamily="18" charset="0"/>
+                          </a:rPr>
+                          <m:t>𝑦</m:t>
+                        </m:r>
+                      </m:oMath>
+                    </m:oMathPara>
+                  </a14:m>
+                  <a:endParaRPr lang="en-US" sz="2400" dirty="0"/>
+                </a:p>
+              </p:txBody>
+            </p:sp>
+          </mc:Choice>
+          <mc:Fallback>
+            <p:sp>
+              <p:nvSpPr>
+                <p:cNvPr id="9" name="TextBox 8">
+                  <a:extLst>
+                    <a:ext uri="{FF2B5EF4-FFF2-40B4-BE49-F238E27FC236}">
+                      <a16:creationId xmlns:a16="http://schemas.microsoft.com/office/drawing/2014/main" id="{F1A2C1AB-7E07-F2A3-2F6A-83518AC9BFFA}"/>
+                    </a:ext>
+                  </a:extLst>
+                </p:cNvPr>
+                <p:cNvSpPr txBox="1">
+                  <a:spLocks noRot="1" noChangeAspect="1" noMove="1" noResize="1" noEditPoints="1" noAdjustHandles="1" noChangeArrowheads="1" noChangeShapeType="1" noTextEdit="1"/>
+                </p:cNvSpPr>
+                <p:nvPr/>
+              </p:nvSpPr>
+              <p:spPr>
+                <a:xfrm>
+                  <a:off x="7010003" y="4175933"/>
+                  <a:ext cx="426399" cy="461665"/>
+                </a:xfrm>
+                <a:prstGeom prst="rect">
+                  <a:avLst/>
+                </a:prstGeom>
+                <a:blipFill>
+                  <a:blip r:embed="rId4"/>
+                  <a:stretch>
+                    <a:fillRect b="-10811"/>
+                  </a:stretch>
+                </a:blipFill>
+              </p:spPr>
+              <p:txBody>
+                <a:bodyPr/>
+                <a:lstStyle/>
+                <a:p>
+                  <a:r>
+                    <a:rPr lang="en-US">
+                      <a:noFill/>
+                    </a:rPr>
+                    <a:t> </a:t>
+                  </a:r>
+                </a:p>
+              </p:txBody>
+            </p:sp>
+          </mc:Fallback>
+        </mc:AlternateContent>
+        <mc:AlternateContent xmlns:mc="http://schemas.openxmlformats.org/markup-compatibility/2006">
+          <mc:Choice xmlns:a14="http://schemas.microsoft.com/office/drawing/2010/main" Requires="a14">
+            <p:sp>
+              <p:nvSpPr>
+                <p:cNvPr id="10" name="TextBox 9">
+                  <a:extLst>
+                    <a:ext uri="{FF2B5EF4-FFF2-40B4-BE49-F238E27FC236}">
+                      <a16:creationId xmlns:a16="http://schemas.microsoft.com/office/drawing/2014/main" id="{BFAB4EC7-E651-87D8-66DB-ED920659601D}"/>
+                    </a:ext>
+                  </a:extLst>
+                </p:cNvPr>
+                <p:cNvSpPr txBox="1"/>
+                <p:nvPr/>
+              </p:nvSpPr>
+              <p:spPr>
+                <a:xfrm>
+                  <a:off x="2473809" y="3807593"/>
+                  <a:ext cx="469487" cy="461665"/>
+                </a:xfrm>
+                <a:prstGeom prst="rect">
+                  <a:avLst/>
+                </a:prstGeom>
+                <a:noFill/>
+              </p:spPr>
+              <p:txBody>
+                <a:bodyPr wrap="none" rtlCol="0">
+                  <a:spAutoFit/>
+                </a:bodyPr>
+                <a:lstStyle/>
+                <a:p>
+                  <a:pPr/>
+                  <a14:m>
+                    <m:oMathPara xmlns:m="http://schemas.openxmlformats.org/officeDocument/2006/math">
+                      <m:oMathParaPr>
+                        <m:jc m:val="centerGroup"/>
+                      </m:oMathParaPr>
+                      <m:oMath xmlns:m="http://schemas.openxmlformats.org/officeDocument/2006/math">
+                        <m:r>
+                          <a:rPr lang="en-US" sz="2400" b="0" i="1" smtClean="0">
+                            <a:latin typeface="Cambria Math" panose="02040503050406030204" pitchFamily="18" charset="0"/>
+                          </a:rPr>
+                          <m:t>𝑂</m:t>
+                        </m:r>
+                      </m:oMath>
+                    </m:oMathPara>
+                  </a14:m>
+                  <a:endParaRPr lang="en-US" sz="2400" dirty="0"/>
+                </a:p>
+              </p:txBody>
+            </p:sp>
+          </mc:Choice>
+          <mc:Fallback>
+            <p:sp>
+              <p:nvSpPr>
+                <p:cNvPr id="10" name="TextBox 9">
+                  <a:extLst>
+                    <a:ext uri="{FF2B5EF4-FFF2-40B4-BE49-F238E27FC236}">
+                      <a16:creationId xmlns:a16="http://schemas.microsoft.com/office/drawing/2014/main" id="{BFAB4EC7-E651-87D8-66DB-ED920659601D}"/>
+                    </a:ext>
+                  </a:extLst>
+                </p:cNvPr>
+                <p:cNvSpPr txBox="1">
+                  <a:spLocks noRot="1" noChangeAspect="1" noMove="1" noResize="1" noEditPoints="1" noAdjustHandles="1" noChangeArrowheads="1" noChangeShapeType="1" noTextEdit="1"/>
+                </p:cNvSpPr>
+                <p:nvPr/>
+              </p:nvSpPr>
+              <p:spPr>
+                <a:xfrm>
+                  <a:off x="2473809" y="3807593"/>
+                  <a:ext cx="469487" cy="461665"/>
+                </a:xfrm>
+                <a:prstGeom prst="rect">
+                  <a:avLst/>
+                </a:prstGeom>
+                <a:blipFill>
+                  <a:blip r:embed="rId5"/>
+                  <a:stretch>
+                    <a:fillRect/>
+                  </a:stretch>
+                </a:blipFill>
+              </p:spPr>
+              <p:txBody>
+                <a:bodyPr/>
+                <a:lstStyle/>
+                <a:p>
+                  <a:r>
+                    <a:rPr lang="en-US">
+                      <a:noFill/>
+                    </a:rPr>
+                    <a:t> </a:t>
+                  </a:r>
+                </a:p>
+              </p:txBody>
+            </p:sp>
+          </mc:Fallback>
+        </mc:AlternateContent>
+        <p:cxnSp>
+          <p:nvCxnSpPr>
+            <p:cNvPr id="12" name="Straight Connector 11">
+              <a:extLst>
+                <a:ext uri="{FF2B5EF4-FFF2-40B4-BE49-F238E27FC236}">
+                  <a16:creationId xmlns:a16="http://schemas.microsoft.com/office/drawing/2014/main" id="{FE333CA3-170A-27D3-04FD-F98D71F1762F}"/>
+                </a:ext>
+              </a:extLst>
+            </p:cNvPr>
+            <p:cNvCxnSpPr>
+              <a:cxnSpLocks/>
+            </p:cNvCxnSpPr>
+            <p:nvPr/>
+          </p:nvCxnSpPr>
+          <p:spPr>
+            <a:xfrm>
+              <a:off x="4793319" y="2098546"/>
+              <a:ext cx="0" cy="3108960"/>
+            </a:xfrm>
+            <a:prstGeom prst="line">
+              <a:avLst/>
+            </a:prstGeom>
+            <a:ln w="19050">
+              <a:solidFill>
+                <a:schemeClr val="tx1"/>
+              </a:solidFill>
+              <a:prstDash val="dash"/>
+            </a:ln>
+          </p:spPr>
+          <p:style>
+            <a:lnRef idx="1">
+              <a:schemeClr val="accent1"/>
+            </a:lnRef>
+            <a:fillRef idx="0">
+              <a:schemeClr val="accent1"/>
+            </a:fillRef>
+            <a:effectRef idx="0">
+              <a:schemeClr val="accent1"/>
+            </a:effectRef>
+            <a:fontRef idx="minor">
+              <a:schemeClr val="tx1"/>
+            </a:fontRef>
+          </p:style>
+        </p:cxnSp>
+        <p:cxnSp>
+          <p:nvCxnSpPr>
+            <p:cNvPr id="13" name="Straight Connector 12">
+              <a:extLst>
+                <a:ext uri="{FF2B5EF4-FFF2-40B4-BE49-F238E27FC236}">
+                  <a16:creationId xmlns:a16="http://schemas.microsoft.com/office/drawing/2014/main" id="{0DFD5FBC-7906-6586-AE65-8F72B3B5C5B6}"/>
+                </a:ext>
+              </a:extLst>
+            </p:cNvPr>
+            <p:cNvCxnSpPr>
+              <a:cxnSpLocks/>
+            </p:cNvCxnSpPr>
+            <p:nvPr/>
+          </p:nvCxnSpPr>
+          <p:spPr>
+            <a:xfrm>
+              <a:off x="1138136" y="5204298"/>
+              <a:ext cx="3620349" cy="0"/>
+            </a:xfrm>
+            <a:prstGeom prst="line">
+              <a:avLst/>
+            </a:prstGeom>
+            <a:ln w="19050">
+              <a:solidFill>
+                <a:schemeClr val="tx1"/>
+              </a:solidFill>
+              <a:prstDash val="dash"/>
+            </a:ln>
+          </p:spPr>
+          <p:style>
+            <a:lnRef idx="1">
+              <a:schemeClr val="accent1"/>
+            </a:lnRef>
+            <a:fillRef idx="0">
+              <a:schemeClr val="accent1"/>
+            </a:fillRef>
+            <a:effectRef idx="0">
+              <a:schemeClr val="accent1"/>
+            </a:effectRef>
+            <a:fontRef idx="minor">
+              <a:schemeClr val="tx1"/>
+            </a:fontRef>
+          </p:style>
+        </p:cxnSp>
+        <p:cxnSp>
+          <p:nvCxnSpPr>
+            <p:cNvPr id="16" name="Straight Arrow Connector 15">
+              <a:extLst>
+                <a:ext uri="{FF2B5EF4-FFF2-40B4-BE49-F238E27FC236}">
+                  <a16:creationId xmlns:a16="http://schemas.microsoft.com/office/drawing/2014/main" id="{60123BFA-75E4-62C5-C715-1EAA55C8387F}"/>
+                </a:ext>
+              </a:extLst>
+            </p:cNvPr>
+            <p:cNvCxnSpPr>
+              <a:cxnSpLocks/>
+            </p:cNvCxnSpPr>
+            <p:nvPr/>
+          </p:nvCxnSpPr>
+          <p:spPr>
+            <a:xfrm>
+              <a:off x="2817017" y="4231950"/>
+              <a:ext cx="1978538" cy="972348"/>
+            </a:xfrm>
+            <a:prstGeom prst="straightConnector1">
+              <a:avLst/>
+            </a:prstGeom>
+            <a:ln w="28575">
+              <a:solidFill>
+                <a:schemeClr val="tx1"/>
+              </a:solidFill>
+              <a:headEnd type="none" w="med" len="med"/>
+              <a:tailEnd type="none" w="med" len="med"/>
+            </a:ln>
+          </p:spPr>
+          <p:style>
+            <a:lnRef idx="1">
+              <a:schemeClr val="accent1"/>
+            </a:lnRef>
+            <a:fillRef idx="0">
+              <a:schemeClr val="accent1"/>
+            </a:fillRef>
+            <a:effectRef idx="0">
+              <a:schemeClr val="accent1"/>
+            </a:effectRef>
+            <a:fontRef idx="minor">
+              <a:schemeClr val="tx1"/>
+            </a:fontRef>
+          </p:style>
+        </p:cxnSp>
+        <mc:AlternateContent xmlns:mc="http://schemas.openxmlformats.org/markup-compatibility/2006">
+          <mc:Choice xmlns:a14="http://schemas.microsoft.com/office/drawing/2010/main" Requires="a14">
+            <p:sp>
+              <p:nvSpPr>
+                <p:cNvPr id="19" name="TextBox 18">
+                  <a:extLst>
+                    <a:ext uri="{FF2B5EF4-FFF2-40B4-BE49-F238E27FC236}">
+                      <a16:creationId xmlns:a16="http://schemas.microsoft.com/office/drawing/2014/main" id="{ACC0CB2B-73C8-BDD1-EC00-9568F69972CB}"/>
+                    </a:ext>
+                  </a:extLst>
+                </p:cNvPr>
+                <p:cNvSpPr txBox="1"/>
+                <p:nvPr/>
+              </p:nvSpPr>
+              <p:spPr>
+                <a:xfrm>
+                  <a:off x="2426760" y="289241"/>
+                  <a:ext cx="407932" cy="461665"/>
+                </a:xfrm>
+                <a:prstGeom prst="rect">
+                  <a:avLst/>
+                </a:prstGeom>
+                <a:noFill/>
+              </p:spPr>
+              <p:txBody>
+                <a:bodyPr wrap="none" rtlCol="0">
+                  <a:spAutoFit/>
+                </a:bodyPr>
+                <a:lstStyle/>
+                <a:p>
+                  <a:pPr/>
+                  <a14:m>
+                    <m:oMathPara xmlns:m="http://schemas.openxmlformats.org/officeDocument/2006/math">
+                      <m:oMathParaPr>
+                        <m:jc m:val="centerGroup"/>
+                      </m:oMathParaPr>
+                      <m:oMath xmlns:m="http://schemas.openxmlformats.org/officeDocument/2006/math">
+                        <m:r>
+                          <a:rPr lang="en-US" sz="2400" b="0" i="1" smtClean="0">
+                            <a:latin typeface="Cambria Math" panose="02040503050406030204" pitchFamily="18" charset="0"/>
+                          </a:rPr>
+                          <m:t>𝑧</m:t>
+                        </m:r>
+                      </m:oMath>
+                    </m:oMathPara>
+                  </a14:m>
+                  <a:endParaRPr lang="en-US" sz="2400" dirty="0"/>
+                </a:p>
+              </p:txBody>
+            </p:sp>
+          </mc:Choice>
+          <mc:Fallback>
+            <p:sp>
+              <p:nvSpPr>
+                <p:cNvPr id="19" name="TextBox 18">
+                  <a:extLst>
+                    <a:ext uri="{FF2B5EF4-FFF2-40B4-BE49-F238E27FC236}">
+                      <a16:creationId xmlns:a16="http://schemas.microsoft.com/office/drawing/2014/main" id="{ACC0CB2B-73C8-BDD1-EC00-9568F69972CB}"/>
+                    </a:ext>
+                  </a:extLst>
+                </p:cNvPr>
+                <p:cNvSpPr txBox="1">
+                  <a:spLocks noRot="1" noChangeAspect="1" noMove="1" noResize="1" noEditPoints="1" noAdjustHandles="1" noChangeArrowheads="1" noChangeShapeType="1" noTextEdit="1"/>
+                </p:cNvSpPr>
+                <p:nvPr/>
+              </p:nvSpPr>
+              <p:spPr>
+                <a:xfrm>
+                  <a:off x="2426760" y="289241"/>
+                  <a:ext cx="407932" cy="461665"/>
+                </a:xfrm>
+                <a:prstGeom prst="rect">
+                  <a:avLst/>
+                </a:prstGeom>
+                <a:blipFill>
+                  <a:blip r:embed="rId6"/>
+                  <a:stretch>
+                    <a:fillRect/>
+                  </a:stretch>
+                </a:blipFill>
+              </p:spPr>
+              <p:txBody>
+                <a:bodyPr/>
+                <a:lstStyle/>
+                <a:p>
+                  <a:r>
+                    <a:rPr lang="en-US">
+                      <a:noFill/>
+                    </a:rPr>
+                    <a:t> </a:t>
+                  </a:r>
+                </a:p>
+              </p:txBody>
+            </p:sp>
+          </mc:Fallback>
+        </mc:AlternateContent>
+        <p:cxnSp>
+          <p:nvCxnSpPr>
+            <p:cNvPr id="23" name="Straight Arrow Connector 22">
+              <a:extLst>
+                <a:ext uri="{FF2B5EF4-FFF2-40B4-BE49-F238E27FC236}">
+                  <a16:creationId xmlns:a16="http://schemas.microsoft.com/office/drawing/2014/main" id="{5CA01A2A-7632-DAFB-43E6-394BBEB85B8F}"/>
+                </a:ext>
+              </a:extLst>
+            </p:cNvPr>
+            <p:cNvCxnSpPr>
+              <a:cxnSpLocks/>
+            </p:cNvCxnSpPr>
+            <p:nvPr/>
+          </p:nvCxnSpPr>
+          <p:spPr>
+            <a:xfrm flipH="1">
+              <a:off x="494174" y="3807593"/>
+              <a:ext cx="3002215" cy="1775299"/>
+            </a:xfrm>
+            <a:prstGeom prst="straightConnector1">
+              <a:avLst/>
+            </a:prstGeom>
+            <a:ln w="19050">
+              <a:tailEnd type="triangle" w="lg" len="lg"/>
+            </a:ln>
+          </p:spPr>
+          <p:style>
+            <a:lnRef idx="1">
+              <a:schemeClr val="accent1"/>
+            </a:lnRef>
+            <a:fillRef idx="0">
+              <a:schemeClr val="accent1"/>
+            </a:fillRef>
+            <a:effectRef idx="0">
+              <a:schemeClr val="accent1"/>
+            </a:effectRef>
+            <a:fontRef idx="minor">
+              <a:schemeClr val="tx1"/>
+            </a:fontRef>
+          </p:style>
+        </p:cxnSp>
+        <p:cxnSp>
+          <p:nvCxnSpPr>
+            <p:cNvPr id="28" name="Straight Arrow Connector 27">
+              <a:extLst>
+                <a:ext uri="{FF2B5EF4-FFF2-40B4-BE49-F238E27FC236}">
+                  <a16:creationId xmlns:a16="http://schemas.microsoft.com/office/drawing/2014/main" id="{80590DF6-A9ED-83F4-40B6-C5B0F8255BE2}"/>
+                </a:ext>
+              </a:extLst>
+            </p:cNvPr>
+            <p:cNvCxnSpPr>
+              <a:cxnSpLocks/>
+            </p:cNvCxnSpPr>
+            <p:nvPr/>
+          </p:nvCxnSpPr>
+          <p:spPr>
+            <a:xfrm>
+              <a:off x="2834692" y="1129499"/>
+              <a:ext cx="1978538" cy="972348"/>
+            </a:xfrm>
+            <a:prstGeom prst="straightConnector1">
+              <a:avLst/>
+            </a:prstGeom>
+            <a:ln w="19050">
+              <a:solidFill>
+                <a:schemeClr val="tx1"/>
+              </a:solidFill>
+              <a:prstDash val="dash"/>
+              <a:headEnd type="none" w="med" len="med"/>
+              <a:tailEnd type="none" w="med" len="med"/>
+            </a:ln>
+          </p:spPr>
+          <p:style>
+            <a:lnRef idx="1">
+              <a:schemeClr val="accent1"/>
+            </a:lnRef>
+            <a:fillRef idx="0">
+              <a:schemeClr val="accent1"/>
+            </a:fillRef>
+            <a:effectRef idx="0">
+              <a:schemeClr val="accent1"/>
+            </a:effectRef>
+            <a:fontRef idx="minor">
+              <a:schemeClr val="tx1"/>
+            </a:fontRef>
+          </p:style>
+        </p:cxnSp>
+        <mc:AlternateContent xmlns:mc="http://schemas.openxmlformats.org/markup-compatibility/2006">
+          <mc:Choice xmlns:a14="http://schemas.microsoft.com/office/drawing/2010/main" Requires="a14">
+            <p:sp>
+              <p:nvSpPr>
+                <p:cNvPr id="29" name="TextBox 28">
+                  <a:extLst>
+                    <a:ext uri="{FF2B5EF4-FFF2-40B4-BE49-F238E27FC236}">
+                      <a16:creationId xmlns:a16="http://schemas.microsoft.com/office/drawing/2014/main" id="{38A02061-48AC-D43C-427D-46D052B6812F}"/>
+                    </a:ext>
+                  </a:extLst>
+                </p:cNvPr>
+                <p:cNvSpPr txBox="1"/>
+                <p:nvPr/>
+              </p:nvSpPr>
+              <p:spPr>
+                <a:xfrm>
+                  <a:off x="2270398" y="1044275"/>
+                  <a:ext cx="585481" cy="461665"/>
+                </a:xfrm>
+                <a:prstGeom prst="rect">
+                  <a:avLst/>
+                </a:prstGeom>
+                <a:noFill/>
+              </p:spPr>
+              <p:txBody>
+                <a:bodyPr wrap="none" rtlCol="0">
+                  <a:spAutoFit/>
+                </a:bodyPr>
+                <a:lstStyle/>
+                <a:p>
+                  <a:pPr/>
+                  <a14:m>
+                    <m:oMathPara xmlns:m="http://schemas.openxmlformats.org/officeDocument/2006/math">
+                      <m:oMathParaPr>
+                        <m:jc m:val="centerGroup"/>
+                      </m:oMathParaPr>
+                      <m:oMath xmlns:m="http://schemas.openxmlformats.org/officeDocument/2006/math">
+                        <m:sSub>
+                          <m:sSubPr>
+                            <m:ctrlPr>
+                              <a:rPr lang="en-US" sz="2400" b="0" i="1" smtClean="0">
+                                <a:latin typeface="Cambria Math" panose="02040503050406030204" pitchFamily="18" charset="0"/>
+                              </a:rPr>
+                            </m:ctrlPr>
+                          </m:sSubPr>
+                          <m:e>
+                            <m:r>
+                              <a:rPr lang="en-US" sz="2400" b="0" i="1" smtClean="0">
+                                <a:latin typeface="Cambria Math" panose="02040503050406030204" pitchFamily="18" charset="0"/>
+                              </a:rPr>
+                              <m:t>𝐴</m:t>
+                            </m:r>
+                          </m:e>
+                          <m:sub>
+                            <m:r>
+                              <a:rPr lang="en-US" sz="2400" b="0" i="1" smtClean="0">
+                                <a:latin typeface="Cambria Math" panose="02040503050406030204" pitchFamily="18" charset="0"/>
+                              </a:rPr>
+                              <m:t>𝑧</m:t>
+                            </m:r>
+                          </m:sub>
+                        </m:sSub>
+                      </m:oMath>
+                    </m:oMathPara>
+                  </a14:m>
+                  <a:endParaRPr lang="en-US" sz="2400" dirty="0"/>
+                </a:p>
+              </p:txBody>
+            </p:sp>
+          </mc:Choice>
+          <mc:Fallback>
+            <p:sp>
+              <p:nvSpPr>
+                <p:cNvPr id="29" name="TextBox 28">
+                  <a:extLst>
+                    <a:ext uri="{FF2B5EF4-FFF2-40B4-BE49-F238E27FC236}">
+                      <a16:creationId xmlns:a16="http://schemas.microsoft.com/office/drawing/2014/main" id="{38A02061-48AC-D43C-427D-46D052B6812F}"/>
+                    </a:ext>
+                  </a:extLst>
+                </p:cNvPr>
+                <p:cNvSpPr txBox="1">
+                  <a:spLocks noRot="1" noChangeAspect="1" noMove="1" noResize="1" noEditPoints="1" noAdjustHandles="1" noChangeArrowheads="1" noChangeShapeType="1" noTextEdit="1"/>
+                </p:cNvSpPr>
+                <p:nvPr/>
+              </p:nvSpPr>
+              <p:spPr>
+                <a:xfrm>
+                  <a:off x="2270398" y="1044275"/>
+                  <a:ext cx="585481" cy="461665"/>
+                </a:xfrm>
+                <a:prstGeom prst="rect">
+                  <a:avLst/>
+                </a:prstGeom>
+                <a:blipFill>
+                  <a:blip r:embed="rId7"/>
+                  <a:stretch>
+                    <a:fillRect/>
+                  </a:stretch>
+                </a:blipFill>
+              </p:spPr>
+              <p:txBody>
+                <a:bodyPr/>
+                <a:lstStyle/>
+                <a:p>
+                  <a:r>
+                    <a:rPr lang="en-US">
+                      <a:noFill/>
+                    </a:rPr>
+                    <a:t> </a:t>
+                  </a:r>
+                </a:p>
+              </p:txBody>
+            </p:sp>
+          </mc:Fallback>
+        </mc:AlternateContent>
+        <mc:AlternateContent xmlns:mc="http://schemas.openxmlformats.org/markup-compatibility/2006">
+          <mc:Choice xmlns:a14="http://schemas.microsoft.com/office/drawing/2010/main" Requires="a14">
+            <p:sp>
+              <p:nvSpPr>
+                <p:cNvPr id="30" name="TextBox 29">
+                  <a:extLst>
+                    <a:ext uri="{FF2B5EF4-FFF2-40B4-BE49-F238E27FC236}">
+                      <a16:creationId xmlns:a16="http://schemas.microsoft.com/office/drawing/2014/main" id="{D57C85EF-8626-A6C6-2DD5-C51BB194731A}"/>
+                    </a:ext>
+                  </a:extLst>
+                </p:cNvPr>
+                <p:cNvSpPr txBox="1"/>
+                <p:nvPr/>
+              </p:nvSpPr>
+              <p:spPr>
+                <a:xfrm>
+                  <a:off x="871079" y="5162762"/>
+                  <a:ext cx="600998" cy="461665"/>
+                </a:xfrm>
+                <a:prstGeom prst="rect">
+                  <a:avLst/>
+                </a:prstGeom>
+                <a:noFill/>
+              </p:spPr>
+              <p:txBody>
+                <a:bodyPr wrap="none" rtlCol="0">
+                  <a:spAutoFit/>
+                </a:bodyPr>
+                <a:lstStyle/>
+                <a:p>
+                  <a:pPr/>
+                  <a14:m>
+                    <m:oMathPara xmlns:m="http://schemas.openxmlformats.org/officeDocument/2006/math">
+                      <m:oMathParaPr>
+                        <m:jc m:val="centerGroup"/>
+                      </m:oMathParaPr>
+                      <m:oMath xmlns:m="http://schemas.openxmlformats.org/officeDocument/2006/math">
+                        <m:sSub>
+                          <m:sSubPr>
+                            <m:ctrlPr>
+                              <a:rPr lang="en-US" sz="2400" b="0" i="1" smtClean="0">
+                                <a:latin typeface="Cambria Math" panose="02040503050406030204" pitchFamily="18" charset="0"/>
+                              </a:rPr>
+                            </m:ctrlPr>
+                          </m:sSubPr>
+                          <m:e>
+                            <m:r>
+                              <a:rPr lang="en-US" sz="2400" b="0" i="1" smtClean="0">
+                                <a:latin typeface="Cambria Math" panose="02040503050406030204" pitchFamily="18" charset="0"/>
+                              </a:rPr>
+                              <m:t>𝐴</m:t>
+                            </m:r>
+                          </m:e>
+                          <m:sub>
+                            <m:r>
+                              <a:rPr lang="en-US" sz="2400" b="0" i="1" smtClean="0">
+                                <a:latin typeface="Cambria Math" panose="02040503050406030204" pitchFamily="18" charset="0"/>
+                              </a:rPr>
+                              <m:t>𝑥</m:t>
+                            </m:r>
+                          </m:sub>
+                        </m:sSub>
+                      </m:oMath>
+                    </m:oMathPara>
+                  </a14:m>
+                  <a:endParaRPr lang="en-US" sz="2400" dirty="0"/>
+                </a:p>
+              </p:txBody>
+            </p:sp>
+          </mc:Choice>
+          <mc:Fallback>
+            <p:sp>
+              <p:nvSpPr>
+                <p:cNvPr id="30" name="TextBox 29">
+                  <a:extLst>
+                    <a:ext uri="{FF2B5EF4-FFF2-40B4-BE49-F238E27FC236}">
+                      <a16:creationId xmlns:a16="http://schemas.microsoft.com/office/drawing/2014/main" id="{D57C85EF-8626-A6C6-2DD5-C51BB194731A}"/>
+                    </a:ext>
+                  </a:extLst>
+                </p:cNvPr>
+                <p:cNvSpPr txBox="1">
+                  <a:spLocks noRot="1" noChangeAspect="1" noMove="1" noResize="1" noEditPoints="1" noAdjustHandles="1" noChangeArrowheads="1" noChangeShapeType="1" noTextEdit="1"/>
+                </p:cNvSpPr>
+                <p:nvPr/>
+              </p:nvSpPr>
+              <p:spPr>
+                <a:xfrm>
+                  <a:off x="871079" y="5162762"/>
+                  <a:ext cx="600998" cy="461665"/>
+                </a:xfrm>
+                <a:prstGeom prst="rect">
+                  <a:avLst/>
+                </a:prstGeom>
+                <a:blipFill>
+                  <a:blip r:embed="rId8"/>
+                  <a:stretch>
+                    <a:fillRect/>
+                  </a:stretch>
+                </a:blipFill>
+              </p:spPr>
+              <p:txBody>
+                <a:bodyPr/>
+                <a:lstStyle/>
+                <a:p>
+                  <a:r>
+                    <a:rPr lang="en-US">
+                      <a:noFill/>
+                    </a:rPr>
+                    <a:t> </a:t>
+                  </a:r>
+                </a:p>
+              </p:txBody>
+            </p:sp>
+          </mc:Fallback>
+        </mc:AlternateContent>
+        <p:cxnSp>
+          <p:nvCxnSpPr>
+            <p:cNvPr id="31" name="Straight Arrow Connector 30">
+              <a:extLst>
+                <a:ext uri="{FF2B5EF4-FFF2-40B4-BE49-F238E27FC236}">
+                  <a16:creationId xmlns:a16="http://schemas.microsoft.com/office/drawing/2014/main" id="{192365D2-6043-AA1D-319A-D4D5A3D9797D}"/>
+                </a:ext>
+              </a:extLst>
+            </p:cNvPr>
+            <p:cNvCxnSpPr>
+              <a:cxnSpLocks noChangeAspect="1"/>
+            </p:cNvCxnSpPr>
+            <p:nvPr/>
+          </p:nvCxnSpPr>
+          <p:spPr>
+            <a:xfrm flipH="1">
+              <a:off x="4802153" y="4231950"/>
+              <a:ext cx="1645920" cy="973284"/>
+            </a:xfrm>
+            <a:prstGeom prst="straightConnector1">
+              <a:avLst/>
+            </a:prstGeom>
+            <a:ln w="19050">
+              <a:solidFill>
+                <a:schemeClr val="tx1"/>
+              </a:solidFill>
+              <a:prstDash val="dash"/>
+              <a:headEnd type="none" w="med" len="med"/>
+              <a:tailEnd type="none" w="med" len="med"/>
+            </a:ln>
+          </p:spPr>
+          <p:style>
+            <a:lnRef idx="1">
+              <a:schemeClr val="accent1"/>
+            </a:lnRef>
+            <a:fillRef idx="0">
+              <a:schemeClr val="accent1"/>
+            </a:fillRef>
+            <a:effectRef idx="0">
+              <a:schemeClr val="accent1"/>
+            </a:effectRef>
+            <a:fontRef idx="minor">
+              <a:schemeClr val="tx1"/>
+            </a:fontRef>
+          </p:style>
+        </p:cxnSp>
+        <mc:AlternateContent xmlns:mc="http://schemas.openxmlformats.org/markup-compatibility/2006">
+          <mc:Choice xmlns:a14="http://schemas.microsoft.com/office/drawing/2010/main" Requires="a14">
+            <p:sp>
+              <p:nvSpPr>
+                <p:cNvPr id="32" name="TextBox 31">
+                  <a:extLst>
+                    <a:ext uri="{FF2B5EF4-FFF2-40B4-BE49-F238E27FC236}">
+                      <a16:creationId xmlns:a16="http://schemas.microsoft.com/office/drawing/2014/main" id="{373F7CD4-81F7-945A-16B7-68C03D736602}"/>
+                    </a:ext>
+                  </a:extLst>
+                </p:cNvPr>
+                <p:cNvSpPr txBox="1"/>
+                <p:nvPr/>
+              </p:nvSpPr>
+              <p:spPr>
+                <a:xfrm>
+                  <a:off x="6200458" y="4175933"/>
+                  <a:ext cx="610039" cy="490840"/>
+                </a:xfrm>
+                <a:prstGeom prst="rect">
+                  <a:avLst/>
+                </a:prstGeom>
+                <a:noFill/>
+              </p:spPr>
+              <p:txBody>
+                <a:bodyPr wrap="none" rtlCol="0">
+                  <a:spAutoFit/>
+                </a:bodyPr>
+                <a:lstStyle/>
+                <a:p>
+                  <a:pPr/>
+                  <a14:m>
+                    <m:oMathPara xmlns:m="http://schemas.openxmlformats.org/officeDocument/2006/math">
+                      <m:oMathParaPr>
+                        <m:jc m:val="centerGroup"/>
+                      </m:oMathParaPr>
+                      <m:oMath xmlns:m="http://schemas.openxmlformats.org/officeDocument/2006/math">
+                        <m:sSub>
+                          <m:sSubPr>
+                            <m:ctrlPr>
+                              <a:rPr lang="en-US" sz="2400" b="0" i="1" smtClean="0">
+                                <a:latin typeface="Cambria Math" panose="02040503050406030204" pitchFamily="18" charset="0"/>
+                              </a:rPr>
+                            </m:ctrlPr>
+                          </m:sSubPr>
+                          <m:e>
+                            <m:r>
+                              <a:rPr lang="en-US" sz="2400" b="0" i="1" smtClean="0">
+                                <a:latin typeface="Cambria Math" panose="02040503050406030204" pitchFamily="18" charset="0"/>
+                              </a:rPr>
+                              <m:t>𝐴</m:t>
+                            </m:r>
+                          </m:e>
+                          <m:sub>
+                            <m:r>
+                              <a:rPr lang="en-US" sz="2400" b="0" i="1" smtClean="0">
+                                <a:latin typeface="Cambria Math" panose="02040503050406030204" pitchFamily="18" charset="0"/>
+                              </a:rPr>
+                              <m:t>𝑦</m:t>
+                            </m:r>
+                          </m:sub>
+                        </m:sSub>
+                      </m:oMath>
+                    </m:oMathPara>
+                  </a14:m>
+                  <a:endParaRPr lang="en-US" sz="2400" dirty="0"/>
+                </a:p>
+              </p:txBody>
+            </p:sp>
+          </mc:Choice>
+          <mc:Fallback>
+            <p:sp>
+              <p:nvSpPr>
+                <p:cNvPr id="32" name="TextBox 31">
+                  <a:extLst>
+                    <a:ext uri="{FF2B5EF4-FFF2-40B4-BE49-F238E27FC236}">
+                      <a16:creationId xmlns:a16="http://schemas.microsoft.com/office/drawing/2014/main" id="{373F7CD4-81F7-945A-16B7-68C03D736602}"/>
+                    </a:ext>
+                  </a:extLst>
+                </p:cNvPr>
+                <p:cNvSpPr txBox="1">
+                  <a:spLocks noRot="1" noChangeAspect="1" noMove="1" noResize="1" noEditPoints="1" noAdjustHandles="1" noChangeArrowheads="1" noChangeShapeType="1" noTextEdit="1"/>
+                </p:cNvSpPr>
+                <p:nvPr/>
+              </p:nvSpPr>
+              <p:spPr>
+                <a:xfrm>
+                  <a:off x="6200458" y="4175933"/>
+                  <a:ext cx="610039" cy="490840"/>
+                </a:xfrm>
+                <a:prstGeom prst="rect">
+                  <a:avLst/>
+                </a:prstGeom>
+                <a:blipFill>
+                  <a:blip r:embed="rId9"/>
+                  <a:stretch>
+                    <a:fillRect b="-5000"/>
+                  </a:stretch>
+                </a:blipFill>
+              </p:spPr>
+              <p:txBody>
+                <a:bodyPr/>
+                <a:lstStyle/>
+                <a:p>
+                  <a:r>
+                    <a:rPr lang="en-US">
+                      <a:noFill/>
+                    </a:rPr>
+                    <a:t> </a:t>
+                  </a:r>
+                </a:p>
+              </p:txBody>
+            </p:sp>
+          </mc:Fallback>
+        </mc:AlternateContent>
+        <p:sp>
+          <p:nvSpPr>
+            <p:cNvPr id="33" name="Arc 32">
+              <a:extLst>
+                <a:ext uri="{FF2B5EF4-FFF2-40B4-BE49-F238E27FC236}">
+                  <a16:creationId xmlns:a16="http://schemas.microsoft.com/office/drawing/2014/main" id="{E0DA06FB-E987-6AAF-CB9A-A15623BAA753}"/>
+                </a:ext>
+              </a:extLst>
+            </p:cNvPr>
+            <p:cNvSpPr/>
+            <p:nvPr/>
+          </p:nvSpPr>
+          <p:spPr>
+            <a:xfrm>
+              <a:off x="2349454" y="3245573"/>
+              <a:ext cx="970477" cy="880347"/>
+            </a:xfrm>
+            <a:prstGeom prst="arc">
+              <a:avLst/>
+            </a:prstGeom>
+            <a:ln w="19050">
+              <a:solidFill>
+                <a:schemeClr val="tx1"/>
+              </a:solidFill>
+            </a:ln>
+          </p:spPr>
+          <p:style>
+            <a:lnRef idx="1">
+              <a:schemeClr val="accent1"/>
+            </a:lnRef>
+            <a:fillRef idx="0">
+              <a:schemeClr val="accent1"/>
+            </a:fillRef>
+            <a:effectRef idx="0">
+              <a:schemeClr val="accent1"/>
+            </a:effectRef>
+            <a:fontRef idx="minor">
+              <a:schemeClr val="tx1"/>
+            </a:fontRef>
+          </p:style>
+          <p:txBody>
+            <a:bodyPr rtlCol="0" anchor="ctr"/>
+            <a:lstStyle/>
+            <a:p>
+              <a:pPr algn="ctr"/>
+              <a:endParaRPr lang="en-US"/>
+            </a:p>
+          </p:txBody>
+        </p:sp>
+        <p:sp>
+          <p:nvSpPr>
+            <p:cNvPr id="34" name="Arc 33">
+              <a:extLst>
+                <a:ext uri="{FF2B5EF4-FFF2-40B4-BE49-F238E27FC236}">
+                  <a16:creationId xmlns:a16="http://schemas.microsoft.com/office/drawing/2014/main" id="{CC90927C-E4E5-882A-D86C-3B03C07A1D61}"/>
+                </a:ext>
+              </a:extLst>
+            </p:cNvPr>
+            <p:cNvSpPr/>
+            <p:nvPr/>
+          </p:nvSpPr>
+          <p:spPr>
+            <a:xfrm>
+              <a:off x="2258711" y="4017259"/>
+              <a:ext cx="1082936" cy="591132"/>
+            </a:xfrm>
+            <a:prstGeom prst="arc">
+              <a:avLst>
+                <a:gd name="adj1" fmla="val 1060599"/>
+                <a:gd name="adj2" fmla="val 9600317"/>
+              </a:avLst>
+            </a:prstGeom>
+            <a:ln w="19050">
+              <a:solidFill>
+                <a:schemeClr val="tx1"/>
+              </a:solidFill>
+            </a:ln>
+          </p:spPr>
+          <p:style>
+            <a:lnRef idx="1">
+              <a:schemeClr val="accent1"/>
+            </a:lnRef>
+            <a:fillRef idx="0">
+              <a:schemeClr val="accent1"/>
+            </a:fillRef>
+            <a:effectRef idx="0">
+              <a:schemeClr val="accent1"/>
+            </a:effectRef>
+            <a:fontRef idx="minor">
+              <a:schemeClr val="tx1"/>
+            </a:fontRef>
+          </p:style>
+          <p:txBody>
+            <a:bodyPr rtlCol="0" anchor="ctr"/>
+            <a:lstStyle/>
+            <a:p>
+              <a:pPr algn="ctr"/>
+              <a:endParaRPr lang="en-US"/>
+            </a:p>
+          </p:txBody>
+        </p:sp>
+        <mc:AlternateContent xmlns:mc="http://schemas.openxmlformats.org/markup-compatibility/2006">
+          <mc:Choice xmlns:a14="http://schemas.microsoft.com/office/drawing/2010/main" Requires="a14">
+            <p:sp>
+              <p:nvSpPr>
+                <p:cNvPr id="35" name="TextBox 34">
+                  <a:extLst>
+                    <a:ext uri="{FF2B5EF4-FFF2-40B4-BE49-F238E27FC236}">
+                      <a16:creationId xmlns:a16="http://schemas.microsoft.com/office/drawing/2014/main" id="{000AF199-7E79-7FBB-EF35-15528FD85A4C}"/>
+                    </a:ext>
+                  </a:extLst>
+                </p:cNvPr>
+                <p:cNvSpPr txBox="1"/>
+                <p:nvPr/>
+              </p:nvSpPr>
+              <p:spPr>
+                <a:xfrm>
+                  <a:off x="2950421" y="2817074"/>
+                  <a:ext cx="435760" cy="461665"/>
+                </a:xfrm>
+                <a:prstGeom prst="rect">
+                  <a:avLst/>
+                </a:prstGeom>
+                <a:noFill/>
+              </p:spPr>
+              <p:txBody>
+                <a:bodyPr wrap="none" rtlCol="0">
+                  <a:spAutoFit/>
+                </a:bodyPr>
+                <a:lstStyle/>
+                <a:p>
+                  <a:pPr/>
+                  <a14:m>
+                    <m:oMathPara xmlns:m="http://schemas.openxmlformats.org/officeDocument/2006/math">
+                      <m:oMathParaPr>
+                        <m:jc m:val="centerGroup"/>
+                      </m:oMathParaPr>
+                      <m:oMath xmlns:m="http://schemas.openxmlformats.org/officeDocument/2006/math">
+                        <m:r>
+                          <a:rPr lang="en-US" sz="2400" b="0" i="1" smtClean="0">
+                            <a:latin typeface="Cambria Math" panose="02040503050406030204" pitchFamily="18" charset="0"/>
+                            <a:ea typeface="Cambria Math" panose="02040503050406030204" pitchFamily="18" charset="0"/>
+                          </a:rPr>
+                          <m:t>𝜃</m:t>
+                        </m:r>
+                      </m:oMath>
+                    </m:oMathPara>
+                  </a14:m>
+                  <a:endParaRPr lang="en-US" sz="2400" dirty="0"/>
+                </a:p>
+              </p:txBody>
+            </p:sp>
+          </mc:Choice>
+          <mc:Fallback>
+            <p:sp>
+              <p:nvSpPr>
+                <p:cNvPr id="35" name="TextBox 34">
+                  <a:extLst>
+                    <a:ext uri="{FF2B5EF4-FFF2-40B4-BE49-F238E27FC236}">
+                      <a16:creationId xmlns:a16="http://schemas.microsoft.com/office/drawing/2014/main" id="{000AF199-7E79-7FBB-EF35-15528FD85A4C}"/>
+                    </a:ext>
+                  </a:extLst>
+                </p:cNvPr>
+                <p:cNvSpPr txBox="1">
+                  <a:spLocks noRot="1" noChangeAspect="1" noMove="1" noResize="1" noEditPoints="1" noAdjustHandles="1" noChangeArrowheads="1" noChangeShapeType="1" noTextEdit="1"/>
+                </p:cNvSpPr>
+                <p:nvPr/>
+              </p:nvSpPr>
+              <p:spPr>
+                <a:xfrm>
+                  <a:off x="2950421" y="2817074"/>
+                  <a:ext cx="435760" cy="461665"/>
+                </a:xfrm>
+                <a:prstGeom prst="rect">
+                  <a:avLst/>
+                </a:prstGeom>
+                <a:blipFill>
+                  <a:blip r:embed="rId10"/>
+                  <a:stretch>
+                    <a:fillRect/>
+                  </a:stretch>
+                </a:blipFill>
+              </p:spPr>
+              <p:txBody>
+                <a:bodyPr/>
+                <a:lstStyle/>
+                <a:p>
+                  <a:r>
+                    <a:rPr lang="en-US">
+                      <a:noFill/>
+                    </a:rPr>
+                    <a:t> </a:t>
+                  </a:r>
+                </a:p>
+              </p:txBody>
+            </p:sp>
+          </mc:Fallback>
+        </mc:AlternateContent>
+        <mc:AlternateContent xmlns:mc="http://schemas.openxmlformats.org/markup-compatibility/2006">
+          <mc:Choice xmlns:a14="http://schemas.microsoft.com/office/drawing/2010/main" Requires="a14">
+            <p:sp>
+              <p:nvSpPr>
+                <p:cNvPr id="36" name="TextBox 35">
+                  <a:extLst>
+                    <a:ext uri="{FF2B5EF4-FFF2-40B4-BE49-F238E27FC236}">
+                      <a16:creationId xmlns:a16="http://schemas.microsoft.com/office/drawing/2014/main" id="{C0AC6C03-A5E8-ED9D-A538-7813A70B7213}"/>
+                    </a:ext>
+                  </a:extLst>
+                </p:cNvPr>
+                <p:cNvSpPr txBox="1"/>
+                <p:nvPr/>
+              </p:nvSpPr>
+              <p:spPr>
+                <a:xfrm>
+                  <a:off x="2300621" y="4518624"/>
+                  <a:ext cx="470193" cy="461665"/>
+                </a:xfrm>
+                <a:prstGeom prst="rect">
+                  <a:avLst/>
+                </a:prstGeom>
+                <a:noFill/>
+              </p:spPr>
+              <p:txBody>
+                <a:bodyPr wrap="none" rtlCol="0">
+                  <a:spAutoFit/>
+                </a:bodyPr>
+                <a:lstStyle/>
+                <a:p>
+                  <a:pPr/>
+                  <a14:m>
+                    <m:oMathPara xmlns:m="http://schemas.openxmlformats.org/officeDocument/2006/math">
+                      <m:oMathParaPr>
+                        <m:jc m:val="centerGroup"/>
+                      </m:oMathParaPr>
+                      <m:oMath xmlns:m="http://schemas.openxmlformats.org/officeDocument/2006/math">
+                        <m:r>
+                          <a:rPr lang="en-US" sz="2400" b="0" i="1" smtClean="0">
+                            <a:latin typeface="Cambria Math" panose="02040503050406030204" pitchFamily="18" charset="0"/>
+                            <a:ea typeface="Cambria Math" panose="02040503050406030204" pitchFamily="18" charset="0"/>
+                          </a:rPr>
+                          <m:t>𝜙</m:t>
+                        </m:r>
+                      </m:oMath>
+                    </m:oMathPara>
+                  </a14:m>
+                  <a:endParaRPr lang="en-US" sz="2400" dirty="0"/>
+                </a:p>
+              </p:txBody>
+            </p:sp>
+          </mc:Choice>
+          <mc:Fallback>
+            <p:sp>
+              <p:nvSpPr>
+                <p:cNvPr id="36" name="TextBox 35">
+                  <a:extLst>
+                    <a:ext uri="{FF2B5EF4-FFF2-40B4-BE49-F238E27FC236}">
+                      <a16:creationId xmlns:a16="http://schemas.microsoft.com/office/drawing/2014/main" id="{C0AC6C03-A5E8-ED9D-A538-7813A70B7213}"/>
+                    </a:ext>
+                  </a:extLst>
+                </p:cNvPr>
+                <p:cNvSpPr txBox="1">
+                  <a:spLocks noRot="1" noChangeAspect="1" noMove="1" noResize="1" noEditPoints="1" noAdjustHandles="1" noChangeArrowheads="1" noChangeShapeType="1" noTextEdit="1"/>
+                </p:cNvSpPr>
+                <p:nvPr/>
+              </p:nvSpPr>
+              <p:spPr>
+                <a:xfrm>
+                  <a:off x="2300621" y="4518624"/>
+                  <a:ext cx="470193" cy="461665"/>
+                </a:xfrm>
+                <a:prstGeom prst="rect">
+                  <a:avLst/>
+                </a:prstGeom>
+                <a:blipFill>
+                  <a:blip r:embed="rId11"/>
+                  <a:stretch>
+                    <a:fillRect l="-2632" b="-16216"/>
+                  </a:stretch>
+                </a:blipFill>
+              </p:spPr>
+              <p:txBody>
+                <a:bodyPr/>
+                <a:lstStyle/>
+                <a:p>
+                  <a:r>
+                    <a:rPr lang="en-US">
+                      <a:noFill/>
+                    </a:rPr>
+                    <a:t> </a:t>
+                  </a:r>
+                </a:p>
+              </p:txBody>
+            </p:sp>
+          </mc:Fallback>
+        </mc:AlternateContent>
+      </p:grpSp>
+    </p:spTree>
+    <p:extLst>
+      <p:ext uri="{BB962C8B-B14F-4D97-AF65-F5344CB8AC3E}">
+        <p14:creationId xmlns:p14="http://schemas.microsoft.com/office/powerpoint/2010/main" val="827035272"/>
+      </p:ext>
+    </p:extLst>
+  </p:cSld>
+  <p:clrMapOvr>
+    <a:masterClrMapping/>
+  </p:clrMapOvr>
+</p:sld>
+</file>
+
+<file path=ppt/slides/slide13.xml><?xml version="1.0" encoding="utf-8"?>
+<p:sld xmlns:a="http://schemas.openxmlformats.org/drawingml/2006/main" xmlns:r="http://schemas.openxmlformats.org/officeDocument/2006/relationships" xmlns:p="http://schemas.openxmlformats.org/presentationml/2006/main">
+  <p:cSld>
+    <p:spTree>
+      <p:nvGrpSpPr>
+        <p:cNvPr id="1" name=""/>
+        <p:cNvGrpSpPr/>
+        <p:nvPr/>
+      </p:nvGrpSpPr>
+      <p:grpSpPr>
+        <a:xfrm>
+          <a:off x="0" y="0"/>
+          <a:ext cx="0" cy="0"/>
+          <a:chOff x="0" y="0"/>
+          <a:chExt cx="0" cy="0"/>
+        </a:xfrm>
+      </p:grpSpPr>
+      <p:cxnSp>
+        <p:nvCxnSpPr>
+          <p:cNvPr id="11" name="Straight Connector 10">
+            <a:extLst>
+              <a:ext uri="{FF2B5EF4-FFF2-40B4-BE49-F238E27FC236}">
+                <a16:creationId xmlns:a16="http://schemas.microsoft.com/office/drawing/2014/main" id="{1EEBB801-A9C7-FD57-5070-EF2912B19C44}"/>
+              </a:ext>
+            </a:extLst>
+          </p:cNvPr>
+          <p:cNvCxnSpPr>
+            <a:cxnSpLocks/>
+          </p:cNvCxnSpPr>
+          <p:nvPr/>
+        </p:nvCxnSpPr>
+        <p:spPr>
+          <a:xfrm>
+            <a:off x="8307303" y="6060332"/>
+            <a:ext cx="3620349" cy="0"/>
+          </a:xfrm>
+          <a:prstGeom prst="line">
+            <a:avLst/>
+          </a:prstGeom>
+          <a:ln w="19050">
+            <a:solidFill>
+              <a:schemeClr val="tx1"/>
+            </a:solidFill>
+            <a:prstDash val="dash"/>
+          </a:ln>
+        </p:spPr>
+        <p:style>
+          <a:lnRef idx="1">
+            <a:schemeClr val="accent1"/>
+          </a:lnRef>
+          <a:fillRef idx="0">
+            <a:schemeClr val="accent1"/>
+          </a:fillRef>
+          <a:effectRef idx="0">
+            <a:schemeClr val="accent1"/>
+          </a:effectRef>
+          <a:fontRef idx="minor">
+            <a:schemeClr val="tx1"/>
+          </a:fontRef>
+        </p:style>
+      </p:cxnSp>
+      <p:cxnSp>
+        <p:nvCxnSpPr>
+          <p:cNvPr id="12" name="Straight Arrow Connector 11">
+            <a:extLst>
+              <a:ext uri="{FF2B5EF4-FFF2-40B4-BE49-F238E27FC236}">
+                <a16:creationId xmlns:a16="http://schemas.microsoft.com/office/drawing/2014/main" id="{49144CCE-BCEA-430B-E55B-591DB4F45390}"/>
+              </a:ext>
+            </a:extLst>
+          </p:cNvPr>
+          <p:cNvCxnSpPr>
+            <a:cxnSpLocks/>
+          </p:cNvCxnSpPr>
+          <p:nvPr/>
+        </p:nvCxnSpPr>
+        <p:spPr>
+          <a:xfrm>
+            <a:off x="9727265" y="1980913"/>
+            <a:ext cx="1978538" cy="972348"/>
+          </a:xfrm>
+          <a:prstGeom prst="straightConnector1">
+            <a:avLst/>
+          </a:prstGeom>
+          <a:ln w="28575">
+            <a:solidFill>
+              <a:schemeClr val="tx1"/>
+            </a:solidFill>
+            <a:headEnd type="none" w="med" len="med"/>
+            <a:tailEnd type="none" w="med" len="med"/>
+          </a:ln>
+        </p:spPr>
+        <p:style>
+          <a:lnRef idx="1">
+            <a:schemeClr val="accent1"/>
+          </a:lnRef>
+          <a:fillRef idx="0">
+            <a:schemeClr val="accent1"/>
+          </a:fillRef>
+          <a:effectRef idx="0">
+            <a:schemeClr val="accent1"/>
+          </a:effectRef>
+          <a:fontRef idx="minor">
+            <a:schemeClr val="tx1"/>
+          </a:fontRef>
+        </p:style>
+      </p:cxnSp>
+      <mc:AlternateContent xmlns:mc="http://schemas.openxmlformats.org/markup-compatibility/2006">
+        <mc:Choice xmlns:a14="http://schemas.microsoft.com/office/drawing/2010/main" Requires="a14">
+          <p:sp>
+            <p:nvSpPr>
+              <p:cNvPr id="13" name="TextBox 12">
+                <a:extLst>
+                  <a:ext uri="{FF2B5EF4-FFF2-40B4-BE49-F238E27FC236}">
+                    <a16:creationId xmlns:a16="http://schemas.microsoft.com/office/drawing/2014/main" id="{099A96E1-04B6-BA71-033A-3F8EB29A8575}"/>
+                  </a:ext>
+                </a:extLst>
+              </p:cNvPr>
+              <p:cNvSpPr txBox="1"/>
+              <p:nvPr/>
+            </p:nvSpPr>
+            <p:spPr>
+              <a:xfrm>
+                <a:off x="10179705" y="533972"/>
+                <a:ext cx="407932" cy="461665"/>
+              </a:xfrm>
+              <a:prstGeom prst="rect">
+                <a:avLst/>
+              </a:prstGeom>
+              <a:noFill/>
+            </p:spPr>
+            <p:txBody>
+              <a:bodyPr wrap="none" rtlCol="0">
+                <a:spAutoFit/>
+              </a:bodyPr>
+              <a:lstStyle/>
+              <a:p>
+                <a:pPr/>
+                <a14:m>
+                  <m:oMathPara xmlns:m="http://schemas.openxmlformats.org/officeDocument/2006/math">
+                    <m:oMathParaPr>
+                      <m:jc m:val="centerGroup"/>
+                    </m:oMathParaPr>
+                    <m:oMath xmlns:m="http://schemas.openxmlformats.org/officeDocument/2006/math">
+                      <m:r>
+                        <a:rPr lang="en-US" sz="2400" b="0" i="1" smtClean="0">
+                          <a:latin typeface="Cambria Math" panose="02040503050406030204" pitchFamily="18" charset="0"/>
+                        </a:rPr>
+                        <m:t>𝑧</m:t>
+                      </m:r>
+                    </m:oMath>
+                  </m:oMathPara>
+                </a14:m>
+                <a:endParaRPr lang="en-US" sz="2400" dirty="0"/>
+              </a:p>
+            </p:txBody>
+          </p:sp>
+        </mc:Choice>
+        <mc:Fallback>
+          <p:sp>
+            <p:nvSpPr>
+              <p:cNvPr id="13" name="TextBox 12">
+                <a:extLst>
+                  <a:ext uri="{FF2B5EF4-FFF2-40B4-BE49-F238E27FC236}">
+                    <a16:creationId xmlns:a16="http://schemas.microsoft.com/office/drawing/2014/main" id="{099A96E1-04B6-BA71-033A-3F8EB29A8575}"/>
+                  </a:ext>
+                </a:extLst>
+              </p:cNvPr>
+              <p:cNvSpPr txBox="1">
+                <a:spLocks noRot="1" noChangeAspect="1" noMove="1" noResize="1" noEditPoints="1" noAdjustHandles="1" noChangeArrowheads="1" noChangeShapeType="1" noTextEdit="1"/>
+              </p:cNvSpPr>
+              <p:nvPr/>
+            </p:nvSpPr>
+            <p:spPr>
+              <a:xfrm>
+                <a:off x="10179705" y="533972"/>
+                <a:ext cx="407932" cy="461665"/>
+              </a:xfrm>
+              <a:prstGeom prst="rect">
+                <a:avLst/>
+              </a:prstGeom>
+              <a:blipFill>
+                <a:blip r:embed="rId2"/>
+                <a:stretch>
+                  <a:fillRect/>
+                </a:stretch>
+              </a:blipFill>
+            </p:spPr>
+            <p:txBody>
+              <a:bodyPr/>
+              <a:lstStyle/>
+              <a:p>
+                <a:r>
+                  <a:rPr lang="en-US">
+                    <a:noFill/>
+                  </a:rPr>
+                  <a:t> </a:t>
+                </a:r>
+              </a:p>
+            </p:txBody>
+          </p:sp>
+        </mc:Fallback>
+      </mc:AlternateContent>
+      <mc:AlternateContent xmlns:mc="http://schemas.openxmlformats.org/markup-compatibility/2006">
+        <mc:Choice xmlns:a14="http://schemas.microsoft.com/office/drawing/2010/main" Requires="a14">
+          <p:sp>
+            <p:nvSpPr>
+              <p:cNvPr id="16" name="TextBox 15">
+                <a:extLst>
+                  <a:ext uri="{FF2B5EF4-FFF2-40B4-BE49-F238E27FC236}">
+                    <a16:creationId xmlns:a16="http://schemas.microsoft.com/office/drawing/2014/main" id="{CC6F3135-DDA5-A69A-C721-91FD472A9697}"/>
+                  </a:ext>
+                </a:extLst>
+              </p:cNvPr>
+              <p:cNvSpPr txBox="1"/>
+              <p:nvPr/>
+            </p:nvSpPr>
+            <p:spPr>
+              <a:xfrm>
+                <a:off x="9342407" y="995637"/>
+                <a:ext cx="585481" cy="461665"/>
+              </a:xfrm>
+              <a:prstGeom prst="rect">
+                <a:avLst/>
+              </a:prstGeom>
+              <a:noFill/>
+            </p:spPr>
+            <p:txBody>
+              <a:bodyPr wrap="none" rtlCol="0">
+                <a:spAutoFit/>
+              </a:bodyPr>
+              <a:lstStyle/>
+              <a:p>
+                <a:pPr/>
+                <a14:m>
+                  <m:oMathPara xmlns:m="http://schemas.openxmlformats.org/officeDocument/2006/math">
+                    <m:oMathParaPr>
+                      <m:jc m:val="centerGroup"/>
+                    </m:oMathParaPr>
+                    <m:oMath xmlns:m="http://schemas.openxmlformats.org/officeDocument/2006/math">
+                      <m:sSub>
+                        <m:sSubPr>
+                          <m:ctrlPr>
+                            <a:rPr lang="en-US" sz="2400" b="0" i="1" smtClean="0">
+                              <a:latin typeface="Cambria Math" panose="02040503050406030204" pitchFamily="18" charset="0"/>
+                            </a:rPr>
+                          </m:ctrlPr>
+                        </m:sSubPr>
+                        <m:e>
+                          <m:r>
+                            <a:rPr lang="en-US" sz="2400" b="0" i="1" smtClean="0">
+                              <a:latin typeface="Cambria Math" panose="02040503050406030204" pitchFamily="18" charset="0"/>
+                            </a:rPr>
+                            <m:t>𝐴</m:t>
+                          </m:r>
+                        </m:e>
+                        <m:sub>
+                          <m:r>
+                            <a:rPr lang="en-US" sz="2400" b="0" i="1" smtClean="0">
+                              <a:latin typeface="Cambria Math" panose="02040503050406030204" pitchFamily="18" charset="0"/>
+                            </a:rPr>
+                            <m:t>𝑧</m:t>
+                          </m:r>
+                        </m:sub>
+                      </m:sSub>
+                    </m:oMath>
+                  </m:oMathPara>
+                </a14:m>
+                <a:endParaRPr lang="en-US" sz="2400" dirty="0"/>
+              </a:p>
+            </p:txBody>
+          </p:sp>
+        </mc:Choice>
+        <mc:Fallback>
+          <p:sp>
+            <p:nvSpPr>
+              <p:cNvPr id="16" name="TextBox 15">
+                <a:extLst>
+                  <a:ext uri="{FF2B5EF4-FFF2-40B4-BE49-F238E27FC236}">
+                    <a16:creationId xmlns:a16="http://schemas.microsoft.com/office/drawing/2014/main" id="{CC6F3135-DDA5-A69A-C721-91FD472A9697}"/>
+                  </a:ext>
+                </a:extLst>
+              </p:cNvPr>
+              <p:cNvSpPr txBox="1">
+                <a:spLocks noRot="1" noChangeAspect="1" noMove="1" noResize="1" noEditPoints="1" noAdjustHandles="1" noChangeArrowheads="1" noChangeShapeType="1" noTextEdit="1"/>
+              </p:cNvSpPr>
+              <p:nvPr/>
+            </p:nvSpPr>
+            <p:spPr>
+              <a:xfrm>
+                <a:off x="9342407" y="995637"/>
+                <a:ext cx="585481" cy="461665"/>
+              </a:xfrm>
+              <a:prstGeom prst="rect">
+                <a:avLst/>
+              </a:prstGeom>
+              <a:blipFill>
+                <a:blip r:embed="rId3"/>
+                <a:stretch>
+                  <a:fillRect/>
+                </a:stretch>
+              </a:blipFill>
+            </p:spPr>
+            <p:txBody>
+              <a:bodyPr/>
+              <a:lstStyle/>
+              <a:p>
+                <a:r>
+                  <a:rPr lang="en-US">
+                    <a:noFill/>
+                  </a:rPr>
+                  <a:t> </a:t>
+                </a:r>
+              </a:p>
+            </p:txBody>
+          </p:sp>
+        </mc:Fallback>
+      </mc:AlternateContent>
+      <p:cxnSp>
+        <p:nvCxnSpPr>
+          <p:cNvPr id="18" name="Straight Arrow Connector 17">
+            <a:extLst>
+              <a:ext uri="{FF2B5EF4-FFF2-40B4-BE49-F238E27FC236}">
+                <a16:creationId xmlns:a16="http://schemas.microsoft.com/office/drawing/2014/main" id="{B5D7B4A6-ED29-C31B-37EB-32334FBBF042}"/>
+              </a:ext>
+            </a:extLst>
+          </p:cNvPr>
+          <p:cNvCxnSpPr>
+            <a:cxnSpLocks noChangeAspect="1"/>
+          </p:cNvCxnSpPr>
+          <p:nvPr/>
+        </p:nvCxnSpPr>
+        <p:spPr>
+          <a:xfrm flipH="1">
+            <a:off x="10383671" y="3134815"/>
+            <a:ext cx="1645920" cy="973284"/>
+          </a:xfrm>
+          <a:prstGeom prst="straightConnector1">
+            <a:avLst/>
+          </a:prstGeom>
+          <a:ln w="19050">
+            <a:solidFill>
+              <a:schemeClr val="tx1"/>
+            </a:solidFill>
+            <a:prstDash val="dash"/>
+            <a:headEnd type="none" w="med" len="med"/>
+            <a:tailEnd type="none" w="med" len="med"/>
+          </a:ln>
+        </p:spPr>
+        <p:style>
+          <a:lnRef idx="1">
+            <a:schemeClr val="accent1"/>
+          </a:lnRef>
+          <a:fillRef idx="0">
+            <a:schemeClr val="accent1"/>
+          </a:fillRef>
+          <a:effectRef idx="0">
+            <a:schemeClr val="accent1"/>
+          </a:effectRef>
+          <a:fontRef idx="minor">
+            <a:schemeClr val="tx1"/>
+          </a:fontRef>
+        </p:style>
+      </p:cxnSp>
+      <p:sp>
+        <p:nvSpPr>
+          <p:cNvPr id="21" name="Arc 20">
+            <a:extLst>
+              <a:ext uri="{FF2B5EF4-FFF2-40B4-BE49-F238E27FC236}">
+                <a16:creationId xmlns:a16="http://schemas.microsoft.com/office/drawing/2014/main" id="{518DB96A-8B49-EA05-611A-FC14116809BA}"/>
+              </a:ext>
+            </a:extLst>
+          </p:cNvPr>
+          <p:cNvSpPr/>
+          <p:nvPr/>
+        </p:nvSpPr>
+        <p:spPr>
+          <a:xfrm>
+            <a:off x="10179705" y="866170"/>
+            <a:ext cx="1082936" cy="591132"/>
+          </a:xfrm>
+          <a:prstGeom prst="arc">
+            <a:avLst>
+              <a:gd name="adj1" fmla="val 1060599"/>
+              <a:gd name="adj2" fmla="val 9600317"/>
+            </a:avLst>
+          </a:prstGeom>
+          <a:ln w="19050">
+            <a:solidFill>
+              <a:schemeClr val="tx1"/>
+            </a:solidFill>
+          </a:ln>
+        </p:spPr>
+        <p:style>
+          <a:lnRef idx="1">
+            <a:schemeClr val="accent1"/>
+          </a:lnRef>
+          <a:fillRef idx="0">
+            <a:schemeClr val="accent1"/>
+          </a:fillRef>
+          <a:effectRef idx="0">
+            <a:schemeClr val="accent1"/>
+          </a:effectRef>
+          <a:fontRef idx="minor">
+            <a:schemeClr val="tx1"/>
+          </a:fontRef>
+        </p:style>
+        <p:txBody>
+          <a:bodyPr rtlCol="0" anchor="ctr"/>
+          <a:lstStyle/>
+          <a:p>
+            <a:pPr algn="ctr"/>
+            <a:endParaRPr lang="en-US"/>
+          </a:p>
+        </p:txBody>
+      </p:sp>
+      <p:grpSp>
+        <p:nvGrpSpPr>
+          <p:cNvPr id="26" name="Group 25">
+            <a:extLst>
+              <a:ext uri="{FF2B5EF4-FFF2-40B4-BE49-F238E27FC236}">
+                <a16:creationId xmlns:a16="http://schemas.microsoft.com/office/drawing/2014/main" id="{712AB09B-FC19-95D2-8B90-407D7DD9CDEA}"/>
+              </a:ext>
+            </a:extLst>
+          </p:cNvPr>
+          <p:cNvGrpSpPr/>
+          <p:nvPr/>
+        </p:nvGrpSpPr>
+        <p:grpSpPr>
+          <a:xfrm>
+            <a:off x="3622891" y="1244325"/>
+            <a:ext cx="4047309" cy="3835942"/>
+            <a:chOff x="3622891" y="1244325"/>
+            <a:chExt cx="4047309" cy="3835942"/>
+          </a:xfrm>
+        </p:grpSpPr>
+        <p:cxnSp>
+          <p:nvCxnSpPr>
+            <p:cNvPr id="3" name="Straight Arrow Connector 2">
+              <a:extLst>
+                <a:ext uri="{FF2B5EF4-FFF2-40B4-BE49-F238E27FC236}">
+                  <a16:creationId xmlns:a16="http://schemas.microsoft.com/office/drawing/2014/main" id="{962E4016-4B9C-EA40-648D-E8A7A0A1E0AA}"/>
+                </a:ext>
+              </a:extLst>
+            </p:cNvPr>
+            <p:cNvCxnSpPr/>
+            <p:nvPr/>
+          </p:nvCxnSpPr>
+          <p:spPr>
+            <a:xfrm>
+              <a:off x="3622891" y="4347497"/>
+              <a:ext cx="3931920" cy="0"/>
+            </a:xfrm>
+            <a:prstGeom prst="straightConnector1">
+              <a:avLst/>
+            </a:prstGeom>
+            <a:ln w="19050">
+              <a:tailEnd type="triangle" w="lg" len="lg"/>
+            </a:ln>
+          </p:spPr>
+          <p:style>
+            <a:lnRef idx="1">
+              <a:schemeClr val="accent1"/>
+            </a:lnRef>
+            <a:fillRef idx="0">
+              <a:schemeClr val="accent1"/>
+            </a:fillRef>
+            <a:effectRef idx="0">
+              <a:schemeClr val="accent1"/>
+            </a:effectRef>
+            <a:fontRef idx="minor">
+              <a:schemeClr val="tx1"/>
+            </a:fontRef>
+          </p:style>
+        </p:cxnSp>
+        <p:cxnSp>
+          <p:nvCxnSpPr>
+            <p:cNvPr id="4" name="Straight Arrow Connector 3">
+              <a:extLst>
+                <a:ext uri="{FF2B5EF4-FFF2-40B4-BE49-F238E27FC236}">
+                  <a16:creationId xmlns:a16="http://schemas.microsoft.com/office/drawing/2014/main" id="{1C2C9D2C-F166-D022-1FB6-DBA5621CC9E0}"/>
+                </a:ext>
+              </a:extLst>
+            </p:cNvPr>
+            <p:cNvCxnSpPr>
+              <a:cxnSpLocks/>
+            </p:cNvCxnSpPr>
+            <p:nvPr/>
+          </p:nvCxnSpPr>
+          <p:spPr>
+            <a:xfrm rot="16200000">
+              <a:off x="2744546" y="3251467"/>
+              <a:ext cx="3657600" cy="0"/>
+            </a:xfrm>
+            <a:prstGeom prst="straightConnector1">
+              <a:avLst/>
+            </a:prstGeom>
+            <a:ln w="19050">
+              <a:tailEnd type="triangle" w="lg" len="lg"/>
+            </a:ln>
+          </p:spPr>
+          <p:style>
+            <a:lnRef idx="1">
+              <a:schemeClr val="accent1"/>
+            </a:lnRef>
+            <a:fillRef idx="0">
+              <a:schemeClr val="accent1"/>
+            </a:fillRef>
+            <a:effectRef idx="0">
+              <a:schemeClr val="accent1"/>
+            </a:effectRef>
+            <a:fontRef idx="minor">
+              <a:schemeClr val="tx1"/>
+            </a:fontRef>
+          </p:style>
+        </p:cxnSp>
+        <p:cxnSp>
+          <p:nvCxnSpPr>
+            <p:cNvPr id="5" name="Straight Arrow Connector 4">
+              <a:extLst>
+                <a:ext uri="{FF2B5EF4-FFF2-40B4-BE49-F238E27FC236}">
+                  <a16:creationId xmlns:a16="http://schemas.microsoft.com/office/drawing/2014/main" id="{802AD77B-834E-472E-904F-64445E5F1A7B}"/>
+                </a:ext>
+              </a:extLst>
+            </p:cNvPr>
+            <p:cNvCxnSpPr>
+              <a:cxnSpLocks/>
+            </p:cNvCxnSpPr>
+            <p:nvPr/>
+          </p:nvCxnSpPr>
+          <p:spPr>
+            <a:xfrm flipV="1">
+              <a:off x="4590763" y="2238928"/>
+              <a:ext cx="1996176" cy="2110675"/>
+            </a:xfrm>
+            <a:prstGeom prst="straightConnector1">
+              <a:avLst/>
+            </a:prstGeom>
+            <a:ln w="38100">
+              <a:solidFill>
+                <a:srgbClr val="FF0000"/>
+              </a:solidFill>
+              <a:tailEnd type="triangle" w="lg" len="lg"/>
+            </a:ln>
+          </p:spPr>
+          <p:style>
+            <a:lnRef idx="1">
+              <a:schemeClr val="accent1"/>
+            </a:lnRef>
+            <a:fillRef idx="0">
+              <a:schemeClr val="accent1"/>
+            </a:fillRef>
+            <a:effectRef idx="0">
+              <a:schemeClr val="accent1"/>
+            </a:effectRef>
+            <a:fontRef idx="minor">
+              <a:schemeClr val="tx1"/>
+            </a:fontRef>
+          </p:style>
+        </p:cxnSp>
+        <mc:AlternateContent xmlns:mc="http://schemas.openxmlformats.org/markup-compatibility/2006">
+          <mc:Choice xmlns:a14="http://schemas.microsoft.com/office/drawing/2010/main" Requires="a14">
+            <p:sp>
+              <p:nvSpPr>
+                <p:cNvPr id="6" name="TextBox 5">
+                  <a:extLst>
+                    <a:ext uri="{FF2B5EF4-FFF2-40B4-BE49-F238E27FC236}">
+                      <a16:creationId xmlns:a16="http://schemas.microsoft.com/office/drawing/2014/main" id="{1D035D7F-638F-CE3E-99A7-EDA08C9C9B09}"/>
+                    </a:ext>
+                  </a:extLst>
+                </p:cNvPr>
+                <p:cNvSpPr txBox="1"/>
+                <p:nvPr/>
+              </p:nvSpPr>
+              <p:spPr>
+                <a:xfrm>
+                  <a:off x="5658599" y="2384022"/>
+                  <a:ext cx="452175" cy="508857"/>
+                </a:xfrm>
+                <a:prstGeom prst="rect">
+                  <a:avLst/>
+                </a:prstGeom>
+                <a:noFill/>
+              </p:spPr>
+              <p:txBody>
+                <a:bodyPr wrap="none" rtlCol="0">
+                  <a:spAutoFit/>
+                </a:bodyPr>
+                <a:lstStyle/>
+                <a:p>
+                  <a:pPr/>
+                  <a14:m>
+                    <m:oMathPara xmlns:m="http://schemas.openxmlformats.org/officeDocument/2006/math">
+                      <m:oMathParaPr>
+                        <m:jc m:val="centerGroup"/>
+                      </m:oMathParaPr>
+                      <m:oMath xmlns:m="http://schemas.openxmlformats.org/officeDocument/2006/math">
+                        <m:acc>
+                          <m:accPr>
+                            <m:chr m:val="⃗"/>
+                            <m:ctrlPr>
+                              <a:rPr lang="en-US" sz="2400" i="1" smtClean="0">
+                                <a:latin typeface="Cambria Math" panose="02040503050406030204" pitchFamily="18" charset="0"/>
+                              </a:rPr>
+                            </m:ctrlPr>
+                          </m:accPr>
+                          <m:e>
+                            <m:r>
+                              <a:rPr lang="en-US" sz="2400" b="0" i="1" smtClean="0">
+                                <a:latin typeface="Cambria Math" panose="02040503050406030204" pitchFamily="18" charset="0"/>
+                              </a:rPr>
+                              <m:t>𝐴</m:t>
+                            </m:r>
+                          </m:e>
+                        </m:acc>
+                      </m:oMath>
+                    </m:oMathPara>
+                  </a14:m>
+                  <a:endParaRPr lang="en-US" sz="2400" dirty="0"/>
+                </a:p>
+              </p:txBody>
+            </p:sp>
+          </mc:Choice>
+          <mc:Fallback>
+            <p:sp>
+              <p:nvSpPr>
+                <p:cNvPr id="6" name="TextBox 5">
+                  <a:extLst>
+                    <a:ext uri="{FF2B5EF4-FFF2-40B4-BE49-F238E27FC236}">
+                      <a16:creationId xmlns:a16="http://schemas.microsoft.com/office/drawing/2014/main" id="{1D035D7F-638F-CE3E-99A7-EDA08C9C9B09}"/>
+                    </a:ext>
+                  </a:extLst>
+                </p:cNvPr>
+                <p:cNvSpPr txBox="1">
+                  <a:spLocks noRot="1" noChangeAspect="1" noMove="1" noResize="1" noEditPoints="1" noAdjustHandles="1" noChangeArrowheads="1" noChangeShapeType="1" noTextEdit="1"/>
+                </p:cNvSpPr>
+                <p:nvPr/>
+              </p:nvSpPr>
+              <p:spPr>
+                <a:xfrm>
+                  <a:off x="5658599" y="2384022"/>
+                  <a:ext cx="452175" cy="508857"/>
+                </a:xfrm>
+                <a:prstGeom prst="rect">
+                  <a:avLst/>
+                </a:prstGeom>
+                <a:blipFill>
+                  <a:blip r:embed="rId4"/>
+                  <a:stretch>
+                    <a:fillRect t="-21429"/>
+                  </a:stretch>
+                </a:blipFill>
+              </p:spPr>
+              <p:txBody>
+                <a:bodyPr/>
+                <a:lstStyle/>
+                <a:p>
+                  <a:r>
+                    <a:rPr lang="en-US">
+                      <a:noFill/>
+                    </a:rPr>
+                    <a:t> </a:t>
+                  </a:r>
+                </a:p>
+              </p:txBody>
+            </p:sp>
+          </mc:Fallback>
+        </mc:AlternateContent>
+        <mc:AlternateContent xmlns:mc="http://schemas.openxmlformats.org/markup-compatibility/2006">
+          <mc:Choice xmlns:a14="http://schemas.microsoft.com/office/drawing/2010/main" Requires="a14">
+            <p:sp>
+              <p:nvSpPr>
+                <p:cNvPr id="7" name="TextBox 6">
+                  <a:extLst>
+                    <a:ext uri="{FF2B5EF4-FFF2-40B4-BE49-F238E27FC236}">
+                      <a16:creationId xmlns:a16="http://schemas.microsoft.com/office/drawing/2014/main" id="{03C22E5E-68C1-7D17-0BEB-61DC5CD163FE}"/>
+                    </a:ext>
+                  </a:extLst>
+                </p:cNvPr>
+                <p:cNvSpPr txBox="1"/>
+                <p:nvPr/>
+              </p:nvSpPr>
+              <p:spPr>
+                <a:xfrm>
+                  <a:off x="7243801" y="4347497"/>
+                  <a:ext cx="426399" cy="461665"/>
+                </a:xfrm>
+                <a:prstGeom prst="rect">
+                  <a:avLst/>
+                </a:prstGeom>
+                <a:noFill/>
+              </p:spPr>
+              <p:txBody>
+                <a:bodyPr wrap="none" rtlCol="0">
+                  <a:spAutoFit/>
+                </a:bodyPr>
+                <a:lstStyle/>
+                <a:p>
+                  <a:pPr/>
+                  <a14:m>
+                    <m:oMathPara xmlns:m="http://schemas.openxmlformats.org/officeDocument/2006/math">
+                      <m:oMathParaPr>
+                        <m:jc m:val="centerGroup"/>
+                      </m:oMathParaPr>
+                      <m:oMath xmlns:m="http://schemas.openxmlformats.org/officeDocument/2006/math">
+                        <m:r>
+                          <a:rPr lang="en-US" sz="2400" b="0" i="1" smtClean="0">
+                            <a:latin typeface="Cambria Math" panose="02040503050406030204" pitchFamily="18" charset="0"/>
+                          </a:rPr>
+                          <m:t>𝑥</m:t>
+                        </m:r>
+                      </m:oMath>
+                    </m:oMathPara>
+                  </a14:m>
+                  <a:endParaRPr lang="en-US" sz="2400" dirty="0"/>
+                </a:p>
+              </p:txBody>
+            </p:sp>
+          </mc:Choice>
+          <mc:Fallback>
+            <p:sp>
+              <p:nvSpPr>
+                <p:cNvPr id="7" name="TextBox 6">
+                  <a:extLst>
+                    <a:ext uri="{FF2B5EF4-FFF2-40B4-BE49-F238E27FC236}">
+                      <a16:creationId xmlns:a16="http://schemas.microsoft.com/office/drawing/2014/main" id="{03C22E5E-68C1-7D17-0BEB-61DC5CD163FE}"/>
+                    </a:ext>
+                  </a:extLst>
+                </p:cNvPr>
+                <p:cNvSpPr txBox="1">
+                  <a:spLocks noRot="1" noChangeAspect="1" noMove="1" noResize="1" noEditPoints="1" noAdjustHandles="1" noChangeArrowheads="1" noChangeShapeType="1" noTextEdit="1"/>
+                </p:cNvSpPr>
+                <p:nvPr/>
+              </p:nvSpPr>
+              <p:spPr>
+                <a:xfrm>
+                  <a:off x="7243801" y="4347497"/>
+                  <a:ext cx="426399" cy="461665"/>
+                </a:xfrm>
+                <a:prstGeom prst="rect">
+                  <a:avLst/>
+                </a:prstGeom>
+                <a:blipFill>
+                  <a:blip r:embed="rId5"/>
+                  <a:stretch>
+                    <a:fillRect/>
+                  </a:stretch>
+                </a:blipFill>
+              </p:spPr>
+              <p:txBody>
+                <a:bodyPr/>
+                <a:lstStyle/>
+                <a:p>
+                  <a:r>
+                    <a:rPr lang="en-US">
+                      <a:noFill/>
+                    </a:rPr>
+                    <a:t> </a:t>
+                  </a:r>
+                </a:p>
+              </p:txBody>
+            </p:sp>
+          </mc:Fallback>
+        </mc:AlternateContent>
+        <mc:AlternateContent xmlns:mc="http://schemas.openxmlformats.org/markup-compatibility/2006">
+          <mc:Choice xmlns:a14="http://schemas.microsoft.com/office/drawing/2010/main" Requires="a14">
+            <p:sp>
+              <p:nvSpPr>
+                <p:cNvPr id="8" name="TextBox 7">
+                  <a:extLst>
+                    <a:ext uri="{FF2B5EF4-FFF2-40B4-BE49-F238E27FC236}">
+                      <a16:creationId xmlns:a16="http://schemas.microsoft.com/office/drawing/2014/main" id="{12B3D7FF-70A3-7816-D9D1-F6F487CEE39E}"/>
+                    </a:ext>
+                  </a:extLst>
+                </p:cNvPr>
+                <p:cNvSpPr txBox="1"/>
+                <p:nvPr/>
+              </p:nvSpPr>
+              <p:spPr>
+                <a:xfrm>
+                  <a:off x="4123164" y="1244325"/>
+                  <a:ext cx="426399" cy="461665"/>
+                </a:xfrm>
+                <a:prstGeom prst="rect">
+                  <a:avLst/>
+                </a:prstGeom>
+                <a:noFill/>
+              </p:spPr>
+              <p:txBody>
+                <a:bodyPr wrap="none" rtlCol="0">
+                  <a:spAutoFit/>
+                </a:bodyPr>
+                <a:lstStyle/>
+                <a:p>
+                  <a:pPr/>
+                  <a14:m>
+                    <m:oMathPara xmlns:m="http://schemas.openxmlformats.org/officeDocument/2006/math">
+                      <m:oMathParaPr>
+                        <m:jc m:val="centerGroup"/>
+                      </m:oMathParaPr>
+                      <m:oMath xmlns:m="http://schemas.openxmlformats.org/officeDocument/2006/math">
+                        <m:r>
+                          <a:rPr lang="en-US" sz="2400" b="0" i="1" smtClean="0">
+                            <a:latin typeface="Cambria Math" panose="02040503050406030204" pitchFamily="18" charset="0"/>
+                          </a:rPr>
+                          <m:t>𝑦</m:t>
+                        </m:r>
+                      </m:oMath>
+                    </m:oMathPara>
+                  </a14:m>
+                  <a:endParaRPr lang="en-US" sz="2400" dirty="0"/>
+                </a:p>
+              </p:txBody>
+            </p:sp>
+          </mc:Choice>
+          <mc:Fallback>
+            <p:sp>
+              <p:nvSpPr>
+                <p:cNvPr id="8" name="TextBox 7">
+                  <a:extLst>
+                    <a:ext uri="{FF2B5EF4-FFF2-40B4-BE49-F238E27FC236}">
+                      <a16:creationId xmlns:a16="http://schemas.microsoft.com/office/drawing/2014/main" id="{12B3D7FF-70A3-7816-D9D1-F6F487CEE39E}"/>
+                    </a:ext>
+                  </a:extLst>
+                </p:cNvPr>
+                <p:cNvSpPr txBox="1">
+                  <a:spLocks noRot="1" noChangeAspect="1" noMove="1" noResize="1" noEditPoints="1" noAdjustHandles="1" noChangeArrowheads="1" noChangeShapeType="1" noTextEdit="1"/>
+                </p:cNvSpPr>
+                <p:nvPr/>
+              </p:nvSpPr>
+              <p:spPr>
+                <a:xfrm>
+                  <a:off x="4123164" y="1244325"/>
+                  <a:ext cx="426399" cy="461665"/>
+                </a:xfrm>
+                <a:prstGeom prst="rect">
+                  <a:avLst/>
+                </a:prstGeom>
+                <a:blipFill>
+                  <a:blip r:embed="rId6"/>
+                  <a:stretch>
+                    <a:fillRect b="-7895"/>
+                  </a:stretch>
+                </a:blipFill>
+              </p:spPr>
+              <p:txBody>
+                <a:bodyPr/>
+                <a:lstStyle/>
+                <a:p>
+                  <a:r>
+                    <a:rPr lang="en-US">
+                      <a:noFill/>
+                    </a:rPr>
+                    <a:t> </a:t>
+                  </a:r>
+                </a:p>
+              </p:txBody>
+            </p:sp>
+          </mc:Fallback>
+        </mc:AlternateContent>
+        <mc:AlternateContent xmlns:mc="http://schemas.openxmlformats.org/markup-compatibility/2006">
+          <mc:Choice xmlns:a14="http://schemas.microsoft.com/office/drawing/2010/main" Requires="a14">
+            <p:sp>
+              <p:nvSpPr>
+                <p:cNvPr id="9" name="TextBox 8">
+                  <a:extLst>
+                    <a:ext uri="{FF2B5EF4-FFF2-40B4-BE49-F238E27FC236}">
+                      <a16:creationId xmlns:a16="http://schemas.microsoft.com/office/drawing/2014/main" id="{214BFBEB-F68B-F73A-5C26-C5D7F53027A6}"/>
+                    </a:ext>
+                  </a:extLst>
+                </p:cNvPr>
+                <p:cNvSpPr txBox="1"/>
+                <p:nvPr/>
+              </p:nvSpPr>
+              <p:spPr>
+                <a:xfrm>
+                  <a:off x="4253971" y="3943780"/>
+                  <a:ext cx="469487" cy="461665"/>
+                </a:xfrm>
+                <a:prstGeom prst="rect">
+                  <a:avLst/>
+                </a:prstGeom>
+                <a:noFill/>
+              </p:spPr>
+              <p:txBody>
+                <a:bodyPr wrap="none" rtlCol="0">
+                  <a:spAutoFit/>
+                </a:bodyPr>
+                <a:lstStyle/>
+                <a:p>
+                  <a:pPr/>
+                  <a14:m>
+                    <m:oMathPara xmlns:m="http://schemas.openxmlformats.org/officeDocument/2006/math">
+                      <m:oMathParaPr>
+                        <m:jc m:val="centerGroup"/>
+                      </m:oMathParaPr>
+                      <m:oMath xmlns:m="http://schemas.openxmlformats.org/officeDocument/2006/math">
+                        <m:r>
+                          <a:rPr lang="en-US" sz="2400" b="0" i="1" smtClean="0">
+                            <a:latin typeface="Cambria Math" panose="02040503050406030204" pitchFamily="18" charset="0"/>
+                          </a:rPr>
+                          <m:t>𝑂</m:t>
+                        </m:r>
+                      </m:oMath>
+                    </m:oMathPara>
+                  </a14:m>
+                  <a:endParaRPr lang="en-US" sz="2400" dirty="0"/>
+                </a:p>
+              </p:txBody>
+            </p:sp>
+          </mc:Choice>
+          <mc:Fallback>
+            <p:sp>
+              <p:nvSpPr>
+                <p:cNvPr id="9" name="TextBox 8">
+                  <a:extLst>
+                    <a:ext uri="{FF2B5EF4-FFF2-40B4-BE49-F238E27FC236}">
+                      <a16:creationId xmlns:a16="http://schemas.microsoft.com/office/drawing/2014/main" id="{214BFBEB-F68B-F73A-5C26-C5D7F53027A6}"/>
+                    </a:ext>
+                  </a:extLst>
+                </p:cNvPr>
+                <p:cNvSpPr txBox="1">
+                  <a:spLocks noRot="1" noChangeAspect="1" noMove="1" noResize="1" noEditPoints="1" noAdjustHandles="1" noChangeArrowheads="1" noChangeShapeType="1" noTextEdit="1"/>
+                </p:cNvSpPr>
+                <p:nvPr/>
+              </p:nvSpPr>
+              <p:spPr>
+                <a:xfrm>
+                  <a:off x="4253971" y="3943780"/>
+                  <a:ext cx="469487" cy="461665"/>
+                </a:xfrm>
+                <a:prstGeom prst="rect">
+                  <a:avLst/>
+                </a:prstGeom>
+                <a:blipFill>
+                  <a:blip r:embed="rId7"/>
+                  <a:stretch>
+                    <a:fillRect/>
+                  </a:stretch>
+                </a:blipFill>
+              </p:spPr>
+              <p:txBody>
+                <a:bodyPr/>
+                <a:lstStyle/>
+                <a:p>
+                  <a:r>
+                    <a:rPr lang="en-US">
+                      <a:noFill/>
+                    </a:rPr>
+                    <a:t> </a:t>
+                  </a:r>
+                </a:p>
+              </p:txBody>
+            </p:sp>
+          </mc:Fallback>
+        </mc:AlternateContent>
+        <p:cxnSp>
+          <p:nvCxnSpPr>
+            <p:cNvPr id="10" name="Straight Connector 9">
+              <a:extLst>
+                <a:ext uri="{FF2B5EF4-FFF2-40B4-BE49-F238E27FC236}">
+                  <a16:creationId xmlns:a16="http://schemas.microsoft.com/office/drawing/2014/main" id="{85102083-F651-6191-9624-2584EEF80704}"/>
+                </a:ext>
+              </a:extLst>
+            </p:cNvPr>
+            <p:cNvCxnSpPr>
+              <a:cxnSpLocks/>
+            </p:cNvCxnSpPr>
+            <p:nvPr/>
+          </p:nvCxnSpPr>
+          <p:spPr>
+            <a:xfrm>
+              <a:off x="6573481" y="2234733"/>
+              <a:ext cx="0" cy="2194560"/>
+            </a:xfrm>
+            <a:prstGeom prst="line">
+              <a:avLst/>
+            </a:prstGeom>
+            <a:ln w="19050">
+              <a:solidFill>
+                <a:schemeClr val="tx1"/>
+              </a:solidFill>
+              <a:prstDash val="dash"/>
+            </a:ln>
+          </p:spPr>
+          <p:style>
+            <a:lnRef idx="1">
+              <a:schemeClr val="accent1"/>
+            </a:lnRef>
+            <a:fillRef idx="0">
+              <a:schemeClr val="accent1"/>
+            </a:fillRef>
+            <a:effectRef idx="0">
+              <a:schemeClr val="accent1"/>
+            </a:effectRef>
+            <a:fontRef idx="minor">
+              <a:schemeClr val="tx1"/>
+            </a:fontRef>
+          </p:style>
+        </p:cxnSp>
+        <p:cxnSp>
+          <p:nvCxnSpPr>
+            <p:cNvPr id="15" name="Straight Arrow Connector 14">
+              <a:extLst>
+                <a:ext uri="{FF2B5EF4-FFF2-40B4-BE49-F238E27FC236}">
+                  <a16:creationId xmlns:a16="http://schemas.microsoft.com/office/drawing/2014/main" id="{7F636107-C525-5A00-DC28-F52E3087B8F9}"/>
+                </a:ext>
+              </a:extLst>
+            </p:cNvPr>
+            <p:cNvCxnSpPr>
+              <a:cxnSpLocks/>
+            </p:cNvCxnSpPr>
+            <p:nvPr/>
+          </p:nvCxnSpPr>
+          <p:spPr>
+            <a:xfrm>
+              <a:off x="4590763" y="2234733"/>
+              <a:ext cx="2002629" cy="0"/>
+            </a:xfrm>
+            <a:prstGeom prst="straightConnector1">
+              <a:avLst/>
+            </a:prstGeom>
+            <a:ln w="19050">
+              <a:solidFill>
+                <a:schemeClr val="tx1"/>
+              </a:solidFill>
+              <a:prstDash val="dash"/>
+              <a:headEnd type="none" w="med" len="med"/>
+              <a:tailEnd type="none" w="med" len="med"/>
+            </a:ln>
+          </p:spPr>
+          <p:style>
+            <a:lnRef idx="1">
+              <a:schemeClr val="accent1"/>
+            </a:lnRef>
+            <a:fillRef idx="0">
+              <a:schemeClr val="accent1"/>
+            </a:fillRef>
+            <a:effectRef idx="0">
+              <a:schemeClr val="accent1"/>
+            </a:effectRef>
+            <a:fontRef idx="minor">
+              <a:schemeClr val="tx1"/>
+            </a:fontRef>
+          </p:style>
+        </p:cxnSp>
+        <mc:AlternateContent xmlns:mc="http://schemas.openxmlformats.org/markup-compatibility/2006">
+          <mc:Choice xmlns:a14="http://schemas.microsoft.com/office/drawing/2010/main" Requires="a14">
+            <p:sp>
+              <p:nvSpPr>
+                <p:cNvPr id="17" name="TextBox 16">
+                  <a:extLst>
+                    <a:ext uri="{FF2B5EF4-FFF2-40B4-BE49-F238E27FC236}">
+                      <a16:creationId xmlns:a16="http://schemas.microsoft.com/office/drawing/2014/main" id="{4EDD4665-1964-4751-1A2A-54DD733D5F4D}"/>
+                    </a:ext>
+                  </a:extLst>
+                </p:cNvPr>
+                <p:cNvSpPr txBox="1"/>
+                <p:nvPr/>
+              </p:nvSpPr>
+              <p:spPr>
+                <a:xfrm>
+                  <a:off x="6356639" y="4366634"/>
+                  <a:ext cx="600998" cy="461665"/>
+                </a:xfrm>
+                <a:prstGeom prst="rect">
+                  <a:avLst/>
+                </a:prstGeom>
+                <a:noFill/>
+              </p:spPr>
+              <p:txBody>
+                <a:bodyPr wrap="none" rtlCol="0">
+                  <a:spAutoFit/>
+                </a:bodyPr>
+                <a:lstStyle/>
+                <a:p>
+                  <a:pPr/>
+                  <a14:m>
+                    <m:oMathPara xmlns:m="http://schemas.openxmlformats.org/officeDocument/2006/math">
+                      <m:oMathParaPr>
+                        <m:jc m:val="centerGroup"/>
+                      </m:oMathParaPr>
+                      <m:oMath xmlns:m="http://schemas.openxmlformats.org/officeDocument/2006/math">
+                        <m:sSub>
+                          <m:sSubPr>
+                            <m:ctrlPr>
+                              <a:rPr lang="en-US" sz="2400" b="0" i="1" smtClean="0">
+                                <a:latin typeface="Cambria Math" panose="02040503050406030204" pitchFamily="18" charset="0"/>
+                              </a:rPr>
+                            </m:ctrlPr>
+                          </m:sSubPr>
+                          <m:e>
+                            <m:r>
+                              <a:rPr lang="en-US" sz="2400" b="0" i="1" smtClean="0">
+                                <a:latin typeface="Cambria Math" panose="02040503050406030204" pitchFamily="18" charset="0"/>
+                              </a:rPr>
+                              <m:t>𝐴</m:t>
+                            </m:r>
+                          </m:e>
+                          <m:sub>
+                            <m:r>
+                              <a:rPr lang="en-US" sz="2400" b="0" i="1" smtClean="0">
+                                <a:latin typeface="Cambria Math" panose="02040503050406030204" pitchFamily="18" charset="0"/>
+                              </a:rPr>
+                              <m:t>𝑥</m:t>
+                            </m:r>
+                          </m:sub>
+                        </m:sSub>
+                      </m:oMath>
+                    </m:oMathPara>
+                  </a14:m>
+                  <a:endParaRPr lang="en-US" sz="2400" dirty="0"/>
+                </a:p>
+              </p:txBody>
+            </p:sp>
+          </mc:Choice>
+          <mc:Fallback>
+            <p:sp>
+              <p:nvSpPr>
+                <p:cNvPr id="17" name="TextBox 16">
+                  <a:extLst>
+                    <a:ext uri="{FF2B5EF4-FFF2-40B4-BE49-F238E27FC236}">
+                      <a16:creationId xmlns:a16="http://schemas.microsoft.com/office/drawing/2014/main" id="{4EDD4665-1964-4751-1A2A-54DD733D5F4D}"/>
+                    </a:ext>
+                  </a:extLst>
+                </p:cNvPr>
+                <p:cNvSpPr txBox="1">
+                  <a:spLocks noRot="1" noChangeAspect="1" noMove="1" noResize="1" noEditPoints="1" noAdjustHandles="1" noChangeArrowheads="1" noChangeShapeType="1" noTextEdit="1"/>
+                </p:cNvSpPr>
+                <p:nvPr/>
+              </p:nvSpPr>
+              <p:spPr>
+                <a:xfrm>
+                  <a:off x="6356639" y="4366634"/>
+                  <a:ext cx="600998" cy="461665"/>
+                </a:xfrm>
+                <a:prstGeom prst="rect">
+                  <a:avLst/>
+                </a:prstGeom>
+                <a:blipFill>
+                  <a:blip r:embed="rId8"/>
+                  <a:stretch>
+                    <a:fillRect/>
+                  </a:stretch>
+                </a:blipFill>
+              </p:spPr>
+              <p:txBody>
+                <a:bodyPr/>
+                <a:lstStyle/>
+                <a:p>
+                  <a:r>
+                    <a:rPr lang="en-US">
+                      <a:noFill/>
+                    </a:rPr>
+                    <a:t> </a:t>
+                  </a:r>
+                </a:p>
+              </p:txBody>
+            </p:sp>
+          </mc:Fallback>
+        </mc:AlternateContent>
+        <mc:AlternateContent xmlns:mc="http://schemas.openxmlformats.org/markup-compatibility/2006">
+          <mc:Choice xmlns:a14="http://schemas.microsoft.com/office/drawing/2010/main" Requires="a14">
+            <p:sp>
+              <p:nvSpPr>
+                <p:cNvPr id="19" name="TextBox 18">
+                  <a:extLst>
+                    <a:ext uri="{FF2B5EF4-FFF2-40B4-BE49-F238E27FC236}">
+                      <a16:creationId xmlns:a16="http://schemas.microsoft.com/office/drawing/2014/main" id="{3AD2D0C5-B005-E7B4-A246-5F2F9CD201DA}"/>
+                    </a:ext>
+                  </a:extLst>
+                </p:cNvPr>
+                <p:cNvSpPr txBox="1"/>
+                <p:nvPr/>
+              </p:nvSpPr>
+              <p:spPr>
+                <a:xfrm>
+                  <a:off x="3963307" y="1989313"/>
+                  <a:ext cx="610039" cy="490840"/>
+                </a:xfrm>
+                <a:prstGeom prst="rect">
+                  <a:avLst/>
+                </a:prstGeom>
+                <a:noFill/>
+              </p:spPr>
+              <p:txBody>
+                <a:bodyPr wrap="none" rtlCol="0">
+                  <a:spAutoFit/>
+                </a:bodyPr>
+                <a:lstStyle/>
+                <a:p>
+                  <a:pPr/>
+                  <a14:m>
+                    <m:oMathPara xmlns:m="http://schemas.openxmlformats.org/officeDocument/2006/math">
+                      <m:oMathParaPr>
+                        <m:jc m:val="centerGroup"/>
+                      </m:oMathParaPr>
+                      <m:oMath xmlns:m="http://schemas.openxmlformats.org/officeDocument/2006/math">
+                        <m:sSub>
+                          <m:sSubPr>
+                            <m:ctrlPr>
+                              <a:rPr lang="en-US" sz="2400" b="0" i="1" smtClean="0">
+                                <a:latin typeface="Cambria Math" panose="02040503050406030204" pitchFamily="18" charset="0"/>
+                              </a:rPr>
+                            </m:ctrlPr>
+                          </m:sSubPr>
+                          <m:e>
+                            <m:r>
+                              <a:rPr lang="en-US" sz="2400" b="0" i="1" smtClean="0">
+                                <a:latin typeface="Cambria Math" panose="02040503050406030204" pitchFamily="18" charset="0"/>
+                              </a:rPr>
+                              <m:t>𝐴</m:t>
+                            </m:r>
+                          </m:e>
+                          <m:sub>
+                            <m:r>
+                              <a:rPr lang="en-US" sz="2400" b="0" i="1" smtClean="0">
+                                <a:latin typeface="Cambria Math" panose="02040503050406030204" pitchFamily="18" charset="0"/>
+                              </a:rPr>
+                              <m:t>𝑦</m:t>
+                            </m:r>
+                          </m:sub>
+                        </m:sSub>
+                      </m:oMath>
+                    </m:oMathPara>
+                  </a14:m>
+                  <a:endParaRPr lang="en-US" sz="2400" dirty="0"/>
+                </a:p>
+              </p:txBody>
+            </p:sp>
+          </mc:Choice>
+          <mc:Fallback>
+            <p:sp>
+              <p:nvSpPr>
+                <p:cNvPr id="19" name="TextBox 18">
+                  <a:extLst>
+                    <a:ext uri="{FF2B5EF4-FFF2-40B4-BE49-F238E27FC236}">
+                      <a16:creationId xmlns:a16="http://schemas.microsoft.com/office/drawing/2014/main" id="{3AD2D0C5-B005-E7B4-A246-5F2F9CD201DA}"/>
+                    </a:ext>
+                  </a:extLst>
+                </p:cNvPr>
+                <p:cNvSpPr txBox="1">
+                  <a:spLocks noRot="1" noChangeAspect="1" noMove="1" noResize="1" noEditPoints="1" noAdjustHandles="1" noChangeArrowheads="1" noChangeShapeType="1" noTextEdit="1"/>
+                </p:cNvSpPr>
+                <p:nvPr/>
+              </p:nvSpPr>
+              <p:spPr>
+                <a:xfrm>
+                  <a:off x="3963307" y="1989313"/>
+                  <a:ext cx="610039" cy="490840"/>
+                </a:xfrm>
+                <a:prstGeom prst="rect">
+                  <a:avLst/>
+                </a:prstGeom>
+                <a:blipFill>
+                  <a:blip r:embed="rId9"/>
+                  <a:stretch>
+                    <a:fillRect b="-5000"/>
+                  </a:stretch>
+                </a:blipFill>
+              </p:spPr>
+              <p:txBody>
+                <a:bodyPr/>
+                <a:lstStyle/>
+                <a:p>
+                  <a:r>
+                    <a:rPr lang="en-US">
+                      <a:noFill/>
+                    </a:rPr>
+                    <a:t> </a:t>
+                  </a:r>
+                </a:p>
+              </p:txBody>
+            </p:sp>
+          </mc:Fallback>
+        </mc:AlternateContent>
+        <p:sp>
+          <p:nvSpPr>
+            <p:cNvPr id="20" name="Arc 19">
+              <a:extLst>
+                <a:ext uri="{FF2B5EF4-FFF2-40B4-BE49-F238E27FC236}">
+                  <a16:creationId xmlns:a16="http://schemas.microsoft.com/office/drawing/2014/main" id="{10BE6CCD-7C1C-1F72-7BED-892A69BBB10B}"/>
+                </a:ext>
+              </a:extLst>
+            </p:cNvPr>
+            <p:cNvSpPr/>
+            <p:nvPr/>
+          </p:nvSpPr>
+          <p:spPr>
+            <a:xfrm>
+              <a:off x="4123164" y="3906956"/>
+              <a:ext cx="970477" cy="880347"/>
+            </a:xfrm>
+            <a:prstGeom prst="arc">
+              <a:avLst>
+                <a:gd name="adj1" fmla="val 18662080"/>
+                <a:gd name="adj2" fmla="val 264518"/>
+              </a:avLst>
+            </a:prstGeom>
+            <a:ln w="19050">
+              <a:solidFill>
+                <a:schemeClr val="tx1"/>
+              </a:solidFill>
+            </a:ln>
+          </p:spPr>
+          <p:style>
+            <a:lnRef idx="1">
+              <a:schemeClr val="accent1"/>
+            </a:lnRef>
+            <a:fillRef idx="0">
+              <a:schemeClr val="accent1"/>
+            </a:fillRef>
+            <a:effectRef idx="0">
+              <a:schemeClr val="accent1"/>
+            </a:effectRef>
+            <a:fontRef idx="minor">
+              <a:schemeClr val="tx1"/>
+            </a:fontRef>
+          </p:style>
+          <p:txBody>
+            <a:bodyPr rtlCol="0" anchor="ctr"/>
+            <a:lstStyle/>
+            <a:p>
+              <a:pPr algn="ctr"/>
+              <a:endParaRPr lang="en-US"/>
+            </a:p>
+          </p:txBody>
+        </p:sp>
+        <mc:AlternateContent xmlns:mc="http://schemas.openxmlformats.org/markup-compatibility/2006">
+          <mc:Choice xmlns:a14="http://schemas.microsoft.com/office/drawing/2010/main" Requires="a14">
+            <p:sp>
+              <p:nvSpPr>
+                <p:cNvPr id="22" name="TextBox 21">
+                  <a:extLst>
+                    <a:ext uri="{FF2B5EF4-FFF2-40B4-BE49-F238E27FC236}">
+                      <a16:creationId xmlns:a16="http://schemas.microsoft.com/office/drawing/2014/main" id="{67CF5177-E247-7C54-545B-3289E152F93D}"/>
+                    </a:ext>
+                  </a:extLst>
+                </p:cNvPr>
+                <p:cNvSpPr txBox="1"/>
+                <p:nvPr/>
+              </p:nvSpPr>
+              <p:spPr>
+                <a:xfrm>
+                  <a:off x="5052468" y="3838641"/>
+                  <a:ext cx="435760" cy="461665"/>
+                </a:xfrm>
+                <a:prstGeom prst="rect">
+                  <a:avLst/>
+                </a:prstGeom>
+                <a:noFill/>
+              </p:spPr>
+              <p:txBody>
+                <a:bodyPr wrap="none" rtlCol="0">
+                  <a:spAutoFit/>
+                </a:bodyPr>
+                <a:lstStyle/>
+                <a:p>
+                  <a:pPr/>
+                  <a14:m>
+                    <m:oMathPara xmlns:m="http://schemas.openxmlformats.org/officeDocument/2006/math">
+                      <m:oMathParaPr>
+                        <m:jc m:val="centerGroup"/>
+                      </m:oMathParaPr>
+                      <m:oMath xmlns:m="http://schemas.openxmlformats.org/officeDocument/2006/math">
+                        <m:r>
+                          <a:rPr lang="en-US" sz="2400" b="0" i="1" smtClean="0">
+                            <a:latin typeface="Cambria Math" panose="02040503050406030204" pitchFamily="18" charset="0"/>
+                            <a:ea typeface="Cambria Math" panose="02040503050406030204" pitchFamily="18" charset="0"/>
+                          </a:rPr>
+                          <m:t>𝜃</m:t>
+                        </m:r>
+                      </m:oMath>
+                    </m:oMathPara>
+                  </a14:m>
+                  <a:endParaRPr lang="en-US" sz="2400" dirty="0"/>
+                </a:p>
+              </p:txBody>
+            </p:sp>
+          </mc:Choice>
+          <mc:Fallback>
+            <p:sp>
+              <p:nvSpPr>
+                <p:cNvPr id="22" name="TextBox 21">
+                  <a:extLst>
+                    <a:ext uri="{FF2B5EF4-FFF2-40B4-BE49-F238E27FC236}">
+                      <a16:creationId xmlns:a16="http://schemas.microsoft.com/office/drawing/2014/main" id="{67CF5177-E247-7C54-545B-3289E152F93D}"/>
+                    </a:ext>
+                  </a:extLst>
+                </p:cNvPr>
+                <p:cNvSpPr txBox="1">
+                  <a:spLocks noRot="1" noChangeAspect="1" noMove="1" noResize="1" noEditPoints="1" noAdjustHandles="1" noChangeArrowheads="1" noChangeShapeType="1" noTextEdit="1"/>
+                </p:cNvSpPr>
+                <p:nvPr/>
+              </p:nvSpPr>
+              <p:spPr>
+                <a:xfrm>
+                  <a:off x="5052468" y="3838641"/>
+                  <a:ext cx="435760" cy="461665"/>
+                </a:xfrm>
+                <a:prstGeom prst="rect">
+                  <a:avLst/>
+                </a:prstGeom>
+                <a:blipFill>
+                  <a:blip r:embed="rId10"/>
+                  <a:stretch>
+                    <a:fillRect/>
+                  </a:stretch>
+                </a:blipFill>
+              </p:spPr>
+              <p:txBody>
+                <a:bodyPr/>
+                <a:lstStyle/>
+                <a:p>
+                  <a:r>
+                    <a:rPr lang="en-US">
+                      <a:noFill/>
+                    </a:rPr>
+                    <a:t> </a:t>
+                  </a:r>
+                </a:p>
+              </p:txBody>
+            </p:sp>
+          </mc:Fallback>
+        </mc:AlternateContent>
+      </p:grpSp>
+      <mc:AlternateContent xmlns:mc="http://schemas.openxmlformats.org/markup-compatibility/2006">
+        <mc:Choice xmlns:a14="http://schemas.microsoft.com/office/drawing/2010/main" Requires="a14">
+          <p:sp>
+            <p:nvSpPr>
+              <p:cNvPr id="23" name="TextBox 22">
+                <a:extLst>
+                  <a:ext uri="{FF2B5EF4-FFF2-40B4-BE49-F238E27FC236}">
+                    <a16:creationId xmlns:a16="http://schemas.microsoft.com/office/drawing/2014/main" id="{BB391C9C-DA18-72CB-8A71-72E00F57073A}"/>
+                  </a:ext>
+                </a:extLst>
+              </p:cNvPr>
+              <p:cNvSpPr txBox="1"/>
+              <p:nvPr/>
+            </p:nvSpPr>
+            <p:spPr>
+              <a:xfrm>
+                <a:off x="10716534" y="1687874"/>
+                <a:ext cx="470193" cy="461665"/>
+              </a:xfrm>
+              <a:prstGeom prst="rect">
+                <a:avLst/>
+              </a:prstGeom>
+              <a:noFill/>
+            </p:spPr>
+            <p:txBody>
+              <a:bodyPr wrap="none" rtlCol="0">
+                <a:spAutoFit/>
+              </a:bodyPr>
+              <a:lstStyle/>
+              <a:p>
+                <a:pPr/>
+                <a14:m>
+                  <m:oMathPara xmlns:m="http://schemas.openxmlformats.org/officeDocument/2006/math">
+                    <m:oMathParaPr>
+                      <m:jc m:val="centerGroup"/>
+                    </m:oMathParaPr>
+                    <m:oMath xmlns:m="http://schemas.openxmlformats.org/officeDocument/2006/math">
+                      <m:r>
+                        <a:rPr lang="en-US" sz="2400" b="0" i="1" smtClean="0">
+                          <a:latin typeface="Cambria Math" panose="02040503050406030204" pitchFamily="18" charset="0"/>
+                          <a:ea typeface="Cambria Math" panose="02040503050406030204" pitchFamily="18" charset="0"/>
+                        </a:rPr>
+                        <m:t>𝜙</m:t>
+                      </m:r>
+                    </m:oMath>
+                  </m:oMathPara>
+                </a14:m>
+                <a:endParaRPr lang="en-US" sz="2400" dirty="0"/>
+              </a:p>
+            </p:txBody>
+          </p:sp>
+        </mc:Choice>
+        <mc:Fallback>
+          <p:sp>
+            <p:nvSpPr>
+              <p:cNvPr id="23" name="TextBox 22">
+                <a:extLst>
+                  <a:ext uri="{FF2B5EF4-FFF2-40B4-BE49-F238E27FC236}">
+                    <a16:creationId xmlns:a16="http://schemas.microsoft.com/office/drawing/2014/main" id="{BB391C9C-DA18-72CB-8A71-72E00F57073A}"/>
+                  </a:ext>
+                </a:extLst>
+              </p:cNvPr>
+              <p:cNvSpPr txBox="1">
+                <a:spLocks noRot="1" noChangeAspect="1" noMove="1" noResize="1" noEditPoints="1" noAdjustHandles="1" noChangeArrowheads="1" noChangeShapeType="1" noTextEdit="1"/>
+              </p:cNvSpPr>
+              <p:nvPr/>
+            </p:nvSpPr>
+            <p:spPr>
+              <a:xfrm>
+                <a:off x="10716534" y="1687874"/>
+                <a:ext cx="470193" cy="461665"/>
+              </a:xfrm>
+              <a:prstGeom prst="rect">
+                <a:avLst/>
+              </a:prstGeom>
+              <a:blipFill>
+                <a:blip r:embed="rId11"/>
+                <a:stretch>
+                  <a:fillRect l="-2632" b="-15789"/>
+                </a:stretch>
+              </a:blipFill>
+            </p:spPr>
+            <p:txBody>
+              <a:bodyPr/>
+              <a:lstStyle/>
+              <a:p>
+                <a:r>
+                  <a:rPr lang="en-US">
+                    <a:noFill/>
+                  </a:rPr>
+                  <a:t> </a:t>
+                </a:r>
+              </a:p>
+            </p:txBody>
+          </p:sp>
+        </mc:Fallback>
+      </mc:AlternateContent>
+    </p:spTree>
+    <p:extLst>
+      <p:ext uri="{BB962C8B-B14F-4D97-AF65-F5344CB8AC3E}">
+        <p14:creationId xmlns:p14="http://schemas.microsoft.com/office/powerpoint/2010/main" val="1728112965"/>
       </p:ext>
     </p:extLst>
   </p:cSld>

</xml_diff>